<commit_message>
after adding review 2
</commit_message>
<xml_diff>
--- a/final/2nd review/Fake Currency Detection Using Image Processing (1).pptx
+++ b/final/2nd review/Fake Currency Detection Using Image Processing (1).pptx
@@ -5,7 +5,7 @@
     <p:sldMasterId id="2147483648" r:id="rId1"/>
   </p:sldMasterIdLst>
   <p:notesMasterIdLst>
-    <p:notesMasterId r:id="rId20"/>
+    <p:notesMasterId r:id="rId24"/>
   </p:notesMasterIdLst>
   <p:sldIdLst>
     <p:sldId id="256" r:id="rId2"/>
@@ -19,13 +19,17 @@
     <p:sldId id="275" r:id="rId10"/>
     <p:sldId id="263" r:id="rId11"/>
     <p:sldId id="264" r:id="rId12"/>
-    <p:sldId id="276" r:id="rId13"/>
-    <p:sldId id="270" r:id="rId14"/>
-    <p:sldId id="271" r:id="rId15"/>
-    <p:sldId id="265" r:id="rId16"/>
-    <p:sldId id="266" r:id="rId17"/>
-    <p:sldId id="267" r:id="rId18"/>
-    <p:sldId id="268" r:id="rId19"/>
+    <p:sldId id="278" r:id="rId13"/>
+    <p:sldId id="279" r:id="rId14"/>
+    <p:sldId id="277" r:id="rId15"/>
+    <p:sldId id="276" r:id="rId16"/>
+    <p:sldId id="270" r:id="rId17"/>
+    <p:sldId id="271" r:id="rId18"/>
+    <p:sldId id="272" r:id="rId19"/>
+    <p:sldId id="265" r:id="rId20"/>
+    <p:sldId id="266" r:id="rId21"/>
+    <p:sldId id="267" r:id="rId22"/>
+    <p:sldId id="268" r:id="rId23"/>
   </p:sldIdLst>
   <p:sldSz cx="12192000" cy="6858000"/>
   <p:notesSz cx="6858000" cy="9144000"/>
@@ -263,7 +267,7 @@
       <p15:sldGuideLst xmlns:p15="http://schemas.microsoft.com/office/powerpoint/2012/main"/>
     </p:ext>
     <p:ext uri="http://customooxmlschemas.google.com/">
-      <go:slidesCustomData xmlns="" xmlns:mc="http://schemas.openxmlformats.org/markup-compatibility/2006" xmlns:mv="urn:schemas-microsoft-com:mac:vml" xmlns:c="http://schemas.openxmlformats.org/drawingml/2006/chart" xmlns:dgm="http://schemas.openxmlformats.org/drawingml/2006/diagram" xmlns:o="urn:schemas-microsoft-com:office:office" xmlns:v="urn:schemas-microsoft-com:vml" xmlns:pvml="urn:schemas-microsoft-com:office:powerpoint" xmlns:com="http://schemas.openxmlformats.org/drawingml/2006/compatibility" xmlns:p14="http://schemas.microsoft.com/office/powerpoint/2010/main" xmlns:p15="http://schemas.microsoft.com/office/powerpoint/2012/main" xmlns:ahyp="http://schemas.microsoft.com/office/drawing/2018/hyperlinkcolor" xmlns:go="http://customooxmlschemas.google.com/" r:id="rId21" roundtripDataSignature="AMtx7mjB/43COq52bOFiCQ0Kf1DjMl6qGQ=="/>
+      <go:slidesCustomData xmlns:go="http://customooxmlschemas.google.com/" xmlns:ahyp="http://schemas.microsoft.com/office/drawing/2018/hyperlinkcolor" xmlns:p15="http://schemas.microsoft.com/office/powerpoint/2012/main" xmlns:p14="http://schemas.microsoft.com/office/powerpoint/2010/main" xmlns:com="http://schemas.openxmlformats.org/drawingml/2006/compatibility" xmlns:pvml="urn:schemas-microsoft-com:office:powerpoint" xmlns:v="urn:schemas-microsoft-com:vml" xmlns:o="urn:schemas-microsoft-com:office:office" xmlns:dgm="http://schemas.openxmlformats.org/drawingml/2006/diagram" xmlns:c="http://schemas.openxmlformats.org/drawingml/2006/chart" xmlns:mv="urn:schemas-microsoft-com:mac:vml" xmlns:mc="http://schemas.openxmlformats.org/markup-compatibility/2006" xmlns="" r:id="rId25" roundtripDataSignature="AMtx7mjB/43COq52bOFiCQ0Kf1DjMl6qGQ=="/>
     </p:ext>
   </p:extLst>
 </p:presentation>
@@ -1273,7 +1277,7 @@
               <a:buSzPts val="1100"/>
               <a:buNone/>
             </a:pPr>
-            <a:endParaRPr/>
+            <a:endParaRPr dirty="0"/>
           </a:p>
         </p:txBody>
       </p:sp>
@@ -16227,10 +16231,6 @@
           </p:nvPr>
         </p:nvSpPr>
         <p:spPr>
-          <a:xfrm>
-            <a:off x="838200" y="450189"/>
-            <a:ext cx="10515600" cy="1006471"/>
-          </a:xfrm>
           <a:prstGeom prst="rect">
             <a:avLst/>
           </a:prstGeom>
@@ -16266,26 +16266,586 @@
           </a:p>
         </p:txBody>
       </p:sp>
+      <p:sp>
+        <p:nvSpPr>
+          <p:cNvPr id="3" name="Text Placeholder 2">
+            <a:extLst>
+              <a:ext uri="{FF2B5EF4-FFF2-40B4-BE49-F238E27FC236}">
+                <a16:creationId xmlns:a16="http://schemas.microsoft.com/office/drawing/2014/main" id="{710E5B3E-73CF-F2C4-D20A-9CC87E4AE92A}"/>
+              </a:ext>
+            </a:extLst>
+          </p:cNvPr>
+          <p:cNvSpPr>
+            <a:spLocks noGrp="1"/>
+          </p:cNvSpPr>
+          <p:nvPr>
+            <p:ph type="body" idx="1"/>
+          </p:nvPr>
+        </p:nvSpPr>
+        <p:spPr/>
+        <p:txBody>
+          <a:bodyPr>
+            <a:normAutofit/>
+          </a:bodyPr>
+          <a:lstStyle/>
+          <a:p>
+            <a:pPr marL="114300" indent="0" algn="just" rtl="0">
+              <a:spcBef>
+                <a:spcPts val="0"/>
+              </a:spcBef>
+              <a:spcAft>
+                <a:spcPts val="0"/>
+              </a:spcAft>
+              <a:buNone/>
+            </a:pPr>
+            <a:r>
+              <a:rPr lang="en-US" sz="2000" b="1" dirty="0"/>
+              <a:t>Data Collection :</a:t>
+            </a:r>
+          </a:p>
+          <a:p>
+            <a:pPr marL="114300" indent="0" algn="just" rtl="0">
+              <a:spcBef>
+                <a:spcPts val="0"/>
+              </a:spcBef>
+              <a:spcAft>
+                <a:spcPts val="0"/>
+              </a:spcAft>
+              <a:buNone/>
+            </a:pPr>
+            <a:endParaRPr lang="en-US" sz="2000" b="1" dirty="0"/>
+          </a:p>
+          <a:p>
+            <a:pPr marL="114300" indent="0" algn="just" rtl="0">
+              <a:spcBef>
+                <a:spcPts val="0"/>
+              </a:spcBef>
+              <a:spcAft>
+                <a:spcPts val="0"/>
+              </a:spcAft>
+              <a:buNone/>
+            </a:pPr>
+            <a:r>
+              <a:rPr lang="en-US" sz="2000" b="1" dirty="0"/>
+              <a:t>	</a:t>
+            </a:r>
+            <a:r>
+              <a:rPr lang="en-US" sz="2000" dirty="0"/>
+              <a:t>This is the first step for creating an unbiased model. The quality of the dataset is as important as the quantity of the dataset, as bias can be induced easily. The crucial part of data collection is feature selection, involves choosing the most relevant features from the preprocessed data. This is important because using irrelevant or redundant features can negatively impact the performance of the machine learning models. Techniques such as correlation analysis, mutual information, and recursive feature elimination can be used for feature selection.</a:t>
+            </a:r>
+          </a:p>
+          <a:p>
+            <a:pPr marL="114300" indent="0" algn="just" rtl="0">
+              <a:spcBef>
+                <a:spcPts val="0"/>
+              </a:spcBef>
+              <a:spcAft>
+                <a:spcPts val="0"/>
+              </a:spcAft>
+              <a:buNone/>
+            </a:pPr>
+            <a:endParaRPr lang="en-US" sz="2000" dirty="0"/>
+          </a:p>
+          <a:p>
+            <a:pPr marL="114300" indent="0" algn="just">
+              <a:spcBef>
+                <a:spcPts val="0"/>
+              </a:spcBef>
+              <a:buNone/>
+            </a:pPr>
+            <a:r>
+              <a:rPr lang="en-US" sz="2000" b="1" u="none" strike="noStrike" cap="none" dirty="0"/>
+              <a:t>Data Pre-processing :</a:t>
+            </a:r>
+          </a:p>
+          <a:p>
+            <a:pPr marL="114300" indent="0" algn="just">
+              <a:spcBef>
+                <a:spcPts val="0"/>
+              </a:spcBef>
+              <a:buNone/>
+            </a:pPr>
+            <a:endParaRPr lang="en-US" sz="2000" b="1" u="none" strike="noStrike" cap="none" dirty="0"/>
+          </a:p>
+          <a:p>
+            <a:pPr marL="114300" indent="0" algn="just" rtl="0">
+              <a:spcBef>
+                <a:spcPts val="0"/>
+              </a:spcBef>
+              <a:spcAft>
+                <a:spcPts val="0"/>
+              </a:spcAft>
+              <a:buNone/>
+            </a:pPr>
+            <a:r>
+              <a:rPr lang="en-US" sz="2000" dirty="0"/>
+              <a:t>	This involves cleaning, normalizing, and transforming the raw data to make it suitable for analysis. The main techniques used in data preprocessing are data cleaning, data transformation, and feature engineering. This step helps to improve the accuracy of the model which we are training. This process is done in order to remove redundancy and in appropriate data.</a:t>
+            </a:r>
+          </a:p>
+          <a:p>
+            <a:pPr marL="114300" indent="0" algn="just" rtl="0">
+              <a:spcBef>
+                <a:spcPts val="0"/>
+              </a:spcBef>
+              <a:spcAft>
+                <a:spcPts val="0"/>
+              </a:spcAft>
+              <a:buNone/>
+            </a:pPr>
+            <a:endParaRPr lang="en-US" sz="2000" dirty="0"/>
+          </a:p>
+          <a:p>
+            <a:pPr marL="114300" indent="0" algn="just" rtl="0">
+              <a:spcBef>
+                <a:spcPts val="0"/>
+              </a:spcBef>
+              <a:spcAft>
+                <a:spcPts val="0"/>
+              </a:spcAft>
+              <a:buNone/>
+            </a:pPr>
+            <a:endParaRPr lang="en-US" sz="2000" dirty="0"/>
+          </a:p>
+          <a:p>
+            <a:pPr marL="114300" indent="0" algn="just" rtl="0">
+              <a:spcBef>
+                <a:spcPts val="0"/>
+              </a:spcBef>
+              <a:spcAft>
+                <a:spcPts val="0"/>
+              </a:spcAft>
+              <a:buNone/>
+            </a:pPr>
+            <a:endParaRPr lang="en-US" sz="2000" dirty="0"/>
+          </a:p>
+        </p:txBody>
+      </p:sp>
+    </p:spTree>
+  </p:cSld>
+  <p:clrMapOvr>
+    <a:masterClrMapping/>
+  </p:clrMapOvr>
+</p:sld>
+</file>
+
+<file path=ppt/slides/slide12.xml><?xml version="1.0" encoding="utf-8"?>
+<p:sld xmlns:a="http://schemas.openxmlformats.org/drawingml/2006/main" xmlns:r="http://schemas.openxmlformats.org/officeDocument/2006/relationships" xmlns:p="http://schemas.openxmlformats.org/presentationml/2006/main">
+  <p:cSld>
+    <p:spTree>
+      <p:nvGrpSpPr>
+        <p:cNvPr id="1" name=""/>
+        <p:cNvGrpSpPr/>
+        <p:nvPr/>
+      </p:nvGrpSpPr>
+      <p:grpSpPr>
+        <a:xfrm>
+          <a:off x="0" y="0"/>
+          <a:ext cx="0" cy="0"/>
+          <a:chOff x="0" y="0"/>
+          <a:chExt cx="0" cy="0"/>
+        </a:xfrm>
+      </p:grpSpPr>
+      <p:sp>
+        <p:nvSpPr>
+          <p:cNvPr id="3" name="Text Placeholder 2">
+            <a:extLst>
+              <a:ext uri="{FF2B5EF4-FFF2-40B4-BE49-F238E27FC236}">
+                <a16:creationId xmlns:a16="http://schemas.microsoft.com/office/drawing/2014/main" id="{F579E5BC-1814-F416-020D-04762778275B}"/>
+              </a:ext>
+            </a:extLst>
+          </p:cNvPr>
+          <p:cNvSpPr>
+            <a:spLocks noGrp="1"/>
+          </p:cNvSpPr>
+          <p:nvPr>
+            <p:ph type="body" idx="1"/>
+          </p:nvPr>
+        </p:nvSpPr>
+        <p:spPr>
+          <a:xfrm>
+            <a:off x="838200" y="1253331"/>
+            <a:ext cx="10515600" cy="4351338"/>
+          </a:xfrm>
+        </p:spPr>
+        <p:txBody>
+          <a:bodyPr>
+            <a:normAutofit/>
+          </a:bodyPr>
+          <a:lstStyle/>
+          <a:p>
+            <a:pPr marL="114300" indent="0" algn="just" rtl="0">
+              <a:spcBef>
+                <a:spcPts val="0"/>
+              </a:spcBef>
+              <a:spcAft>
+                <a:spcPts val="0"/>
+              </a:spcAft>
+              <a:buNone/>
+            </a:pPr>
+            <a:r>
+              <a:rPr lang="en-US" sz="2000" b="1" dirty="0"/>
+              <a:t>Model Building :</a:t>
+            </a:r>
+          </a:p>
+          <a:p>
+            <a:pPr marL="114300" indent="0" algn="just" rtl="0">
+              <a:spcBef>
+                <a:spcPts val="0"/>
+              </a:spcBef>
+              <a:spcAft>
+                <a:spcPts val="0"/>
+              </a:spcAft>
+              <a:buNone/>
+            </a:pPr>
+            <a:r>
+              <a:rPr lang="en-US" sz="2000" b="1" dirty="0"/>
+              <a:t>	</a:t>
+            </a:r>
+          </a:p>
+          <a:p>
+            <a:pPr marL="114300" indent="0" algn="just" rtl="0">
+              <a:spcBef>
+                <a:spcPts val="0"/>
+              </a:spcBef>
+              <a:spcAft>
+                <a:spcPts val="0"/>
+              </a:spcAft>
+              <a:buNone/>
+            </a:pPr>
+            <a:r>
+              <a:rPr lang="en-US" sz="2000" b="1" dirty="0"/>
+              <a:t>	</a:t>
+            </a:r>
+            <a:r>
+              <a:rPr lang="en-US" sz="2000" dirty="0"/>
+              <a:t>In this module the main part is choosing the appropriate algorithm for finding the fake currency from the properties of the image which is given. For our project we have concluded to use K-Nearest Neighbor algorithm to detect the fake currency, as KNN algorithm keep adding new data to the dataset, the prediction is adjusted without having to retrain a new model. So It is easy to keep the model </a:t>
+            </a:r>
+            <a:r>
+              <a:rPr lang="en-US" sz="2000" dirty="0" err="1"/>
+              <a:t>upto</a:t>
+            </a:r>
+            <a:r>
+              <a:rPr lang="en-US" sz="2000" dirty="0"/>
+              <a:t> date.</a:t>
+            </a:r>
+          </a:p>
+          <a:p>
+            <a:pPr marL="114300" indent="0" algn="just" rtl="0">
+              <a:spcBef>
+                <a:spcPts val="0"/>
+              </a:spcBef>
+              <a:spcAft>
+                <a:spcPts val="0"/>
+              </a:spcAft>
+              <a:buNone/>
+            </a:pPr>
+            <a:endParaRPr lang="en-US" sz="2000" dirty="0"/>
+          </a:p>
+          <a:p>
+            <a:pPr marL="114300" indent="0" algn="just">
+              <a:spcBef>
+                <a:spcPts val="0"/>
+              </a:spcBef>
+              <a:buNone/>
+            </a:pPr>
+            <a:r>
+              <a:rPr lang="en-US" sz="2000" b="1" u="none" strike="noStrike" cap="none" dirty="0"/>
+              <a:t>Training and Testing :</a:t>
+            </a:r>
+          </a:p>
+          <a:p>
+            <a:pPr marL="114300" indent="0" algn="just">
+              <a:spcBef>
+                <a:spcPts val="0"/>
+              </a:spcBef>
+              <a:buNone/>
+            </a:pPr>
+            <a:endParaRPr lang="en-US" sz="2000" b="1" u="none" strike="noStrike" cap="none" dirty="0"/>
+          </a:p>
+          <a:p>
+            <a:pPr marL="114300" indent="0" algn="just" rtl="0">
+              <a:spcBef>
+                <a:spcPts val="0"/>
+              </a:spcBef>
+              <a:spcAft>
+                <a:spcPts val="0"/>
+              </a:spcAft>
+              <a:buNone/>
+            </a:pPr>
+            <a:r>
+              <a:rPr lang="en-US" sz="2000" dirty="0"/>
+              <a:t>	This process involves many iteration of model training with the data which we have cleaned in the previous steps until the model stabilizes and produces accurate results. Testing is the process of evaluating these results to obtain a unbiased model. If the model is biased the data set should be normalized properly.</a:t>
+            </a:r>
+          </a:p>
+          <a:p>
+            <a:pPr marL="114300" indent="0" algn="just" rtl="0">
+              <a:spcBef>
+                <a:spcPts val="0"/>
+              </a:spcBef>
+              <a:spcAft>
+                <a:spcPts val="0"/>
+              </a:spcAft>
+              <a:buNone/>
+            </a:pPr>
+            <a:endParaRPr lang="en-US" sz="2000" dirty="0"/>
+          </a:p>
+          <a:p>
+            <a:pPr marL="114300" indent="0" algn="just" rtl="0">
+              <a:spcBef>
+                <a:spcPts val="0"/>
+              </a:spcBef>
+              <a:spcAft>
+                <a:spcPts val="0"/>
+              </a:spcAft>
+              <a:buNone/>
+            </a:pPr>
+            <a:endParaRPr lang="en-US" sz="2000" dirty="0"/>
+          </a:p>
+          <a:p>
+            <a:pPr marL="114300" indent="0">
+              <a:buNone/>
+            </a:pPr>
+            <a:endParaRPr lang="en-IN" sz="2000" dirty="0"/>
+          </a:p>
+        </p:txBody>
+      </p:sp>
+    </p:spTree>
+    <p:extLst>
+      <p:ext uri="{BB962C8B-B14F-4D97-AF65-F5344CB8AC3E}">
+        <p14:creationId xmlns:p14="http://schemas.microsoft.com/office/powerpoint/2010/main" val="3509316191"/>
+      </p:ext>
+    </p:extLst>
+  </p:cSld>
+  <p:clrMapOvr>
+    <a:masterClrMapping/>
+  </p:clrMapOvr>
+</p:sld>
+</file>
+
+<file path=ppt/slides/slide13.xml><?xml version="1.0" encoding="utf-8"?>
+<p:sld xmlns:a="http://schemas.openxmlformats.org/drawingml/2006/main" xmlns:r="http://schemas.openxmlformats.org/officeDocument/2006/relationships" xmlns:p="http://schemas.openxmlformats.org/presentationml/2006/main">
+  <p:cSld>
+    <p:spTree>
+      <p:nvGrpSpPr>
+        <p:cNvPr id="1" name=""/>
+        <p:cNvGrpSpPr/>
+        <p:nvPr/>
+      </p:nvGrpSpPr>
+      <p:grpSpPr>
+        <a:xfrm>
+          <a:off x="0" y="0"/>
+          <a:ext cx="0" cy="0"/>
+          <a:chOff x="0" y="0"/>
+          <a:chExt cx="0" cy="0"/>
+        </a:xfrm>
+      </p:grpSpPr>
+      <p:sp>
+        <p:nvSpPr>
+          <p:cNvPr id="3" name="Text Placeholder 2">
+            <a:extLst>
+              <a:ext uri="{FF2B5EF4-FFF2-40B4-BE49-F238E27FC236}">
+                <a16:creationId xmlns:a16="http://schemas.microsoft.com/office/drawing/2014/main" id="{C762B07A-03FB-8B5E-5309-740A118CFACA}"/>
+              </a:ext>
+            </a:extLst>
+          </p:cNvPr>
+          <p:cNvSpPr>
+            <a:spLocks noGrp="1"/>
+          </p:cNvSpPr>
+          <p:nvPr>
+            <p:ph type="body" idx="1"/>
+          </p:nvPr>
+        </p:nvSpPr>
+        <p:spPr>
+          <a:xfrm>
+            <a:off x="838200" y="1253331"/>
+            <a:ext cx="10515600" cy="4351338"/>
+          </a:xfrm>
+        </p:spPr>
+        <p:txBody>
+          <a:bodyPr>
+            <a:normAutofit/>
+          </a:bodyPr>
+          <a:lstStyle/>
+          <a:p>
+            <a:pPr marL="114300" indent="0" algn="just" rtl="0">
+              <a:spcBef>
+                <a:spcPts val="0"/>
+              </a:spcBef>
+              <a:spcAft>
+                <a:spcPts val="0"/>
+              </a:spcAft>
+              <a:buNone/>
+            </a:pPr>
+            <a:r>
+              <a:rPr lang="en-US" sz="2000" b="1" dirty="0"/>
+              <a:t>App building :</a:t>
+            </a:r>
+          </a:p>
+          <a:p>
+            <a:pPr marL="114300" indent="0" algn="just" rtl="0">
+              <a:spcBef>
+                <a:spcPts val="0"/>
+              </a:spcBef>
+              <a:spcAft>
+                <a:spcPts val="0"/>
+              </a:spcAft>
+              <a:buNone/>
+            </a:pPr>
+            <a:r>
+              <a:rPr lang="en-US" sz="2000" b="1" dirty="0"/>
+              <a:t>	</a:t>
+            </a:r>
+          </a:p>
+          <a:p>
+            <a:pPr marL="114300" indent="0" algn="just" rtl="0">
+              <a:spcBef>
+                <a:spcPts val="0"/>
+              </a:spcBef>
+              <a:spcAft>
+                <a:spcPts val="0"/>
+              </a:spcAft>
+              <a:buNone/>
+            </a:pPr>
+            <a:r>
+              <a:rPr lang="en-US" sz="2000" b="1" dirty="0"/>
+              <a:t>	</a:t>
+            </a:r>
+            <a:r>
+              <a:rPr lang="en-US" sz="2000" dirty="0"/>
+              <a:t>In this step the model which we have built is integrated with the mobile application with the help of Application programmable interface, and the application is tested for any errors which may occur due to communication failure.</a:t>
+            </a:r>
+          </a:p>
+          <a:p>
+            <a:pPr marL="114300" indent="0" algn="just" rtl="0">
+              <a:spcBef>
+                <a:spcPts val="0"/>
+              </a:spcBef>
+              <a:spcAft>
+                <a:spcPts val="0"/>
+              </a:spcAft>
+              <a:buNone/>
+            </a:pPr>
+            <a:endParaRPr lang="en-US" sz="2000" dirty="0"/>
+          </a:p>
+          <a:p>
+            <a:pPr marL="114300" indent="0" algn="just">
+              <a:spcBef>
+                <a:spcPts val="0"/>
+              </a:spcBef>
+              <a:buNone/>
+            </a:pPr>
+            <a:r>
+              <a:rPr lang="en-US" sz="2000" b="1" u="none" strike="noStrike" cap="none" dirty="0"/>
+              <a:t>Deploy the app :</a:t>
+            </a:r>
+          </a:p>
+          <a:p>
+            <a:pPr marL="114300" indent="0" algn="just">
+              <a:spcBef>
+                <a:spcPts val="0"/>
+              </a:spcBef>
+              <a:buNone/>
+            </a:pPr>
+            <a:endParaRPr lang="en-US" sz="2000" b="1" u="none" strike="noStrike" cap="none" dirty="0"/>
+          </a:p>
+          <a:p>
+            <a:pPr marL="114300" indent="0" algn="just" rtl="0">
+              <a:spcBef>
+                <a:spcPts val="0"/>
+              </a:spcBef>
+              <a:spcAft>
+                <a:spcPts val="0"/>
+              </a:spcAft>
+              <a:buNone/>
+            </a:pPr>
+            <a:r>
+              <a:rPr lang="en-US" sz="2000" dirty="0"/>
+              <a:t>	This is the final step which is to deploy the application in the web.</a:t>
+            </a:r>
+          </a:p>
+          <a:p>
+            <a:pPr marL="114300" indent="0" algn="just" rtl="0">
+              <a:spcBef>
+                <a:spcPts val="0"/>
+              </a:spcBef>
+              <a:spcAft>
+                <a:spcPts val="0"/>
+              </a:spcAft>
+              <a:buNone/>
+            </a:pPr>
+            <a:endParaRPr lang="en-US" sz="2000" dirty="0"/>
+          </a:p>
+          <a:p>
+            <a:pPr marL="114300" indent="0">
+              <a:buNone/>
+            </a:pPr>
+            <a:endParaRPr lang="en-IN" sz="2000" dirty="0"/>
+          </a:p>
+          <a:p>
+            <a:pPr marL="114300" indent="0">
+              <a:buNone/>
+            </a:pPr>
+            <a:endParaRPr lang="en-IN" sz="2000" dirty="0"/>
+          </a:p>
+        </p:txBody>
+      </p:sp>
+    </p:spTree>
+    <p:extLst>
+      <p:ext uri="{BB962C8B-B14F-4D97-AF65-F5344CB8AC3E}">
+        <p14:creationId xmlns:p14="http://schemas.microsoft.com/office/powerpoint/2010/main" val="3230230545"/>
+      </p:ext>
+    </p:extLst>
+  </p:cSld>
+  <p:clrMapOvr>
+    <a:masterClrMapping/>
+  </p:clrMapOvr>
+</p:sld>
+</file>
+
+<file path=ppt/slides/slide14.xml><?xml version="1.0" encoding="utf-8"?>
+<p:sld xmlns:a="http://schemas.openxmlformats.org/drawingml/2006/main" xmlns:r="http://schemas.openxmlformats.org/officeDocument/2006/relationships" xmlns:p="http://schemas.openxmlformats.org/presentationml/2006/main">
+  <p:cSld>
+    <p:spTree>
+      <p:nvGrpSpPr>
+        <p:cNvPr id="1" name=""/>
+        <p:cNvGrpSpPr/>
+        <p:nvPr/>
+      </p:nvGrpSpPr>
+      <p:grpSpPr>
+        <a:xfrm>
+          <a:off x="0" y="0"/>
+          <a:ext cx="0" cy="0"/>
+          <a:chOff x="0" y="0"/>
+          <a:chExt cx="0" cy="0"/>
+        </a:xfrm>
+      </p:grpSpPr>
       <p:graphicFrame>
         <p:nvGraphicFramePr>
-          <p:cNvPr id="143" name="Google Shape;143;p23"/>
+          <p:cNvPr id="4" name="Google Shape;143;p23">
+            <a:extLst>
+              <a:ext uri="{FF2B5EF4-FFF2-40B4-BE49-F238E27FC236}">
+                <a16:creationId xmlns:a16="http://schemas.microsoft.com/office/drawing/2014/main" id="{493CADA2-EEBB-D25F-14EB-AFD06A80459A}"/>
+              </a:ext>
+            </a:extLst>
+          </p:cNvPr>
           <p:cNvGraphicFramePr/>
           <p:nvPr>
             <p:extLst>
               <p:ext uri="{D42A27DB-BD31-4B8C-83A1-F6EECF244321}">
-                <p14:modId xmlns:p14="http://schemas.microsoft.com/office/powerpoint/2010/main" val="267449497"/>
+                <p14:modId xmlns:p14="http://schemas.microsoft.com/office/powerpoint/2010/main" val="2990042781"/>
               </p:ext>
             </p:extLst>
           </p:nvPr>
         </p:nvGraphicFramePr>
         <p:xfrm>
-          <a:off x="1020721" y="1731275"/>
+          <a:off x="977300" y="1265720"/>
           <a:ext cx="10237400" cy="4326560"/>
         </p:xfrm>
         <a:graphic>
           <a:graphicData uri="http://schemas.openxmlformats.org/drawingml/2006/table">
             <a:tbl>
               <a:tblPr firstRow="1" bandRow="1">
+                <a:noFill/>
                 <a:tableStyleId>{061FC83F-78A8-4D6F-A3F0-7781150E8C83}</a:tableStyleId>
               </a:tblPr>
               <a:tblGrid>
@@ -16351,7 +16911,11 @@
                       </a:endParaRPr>
                     </a:p>
                   </a:txBody>
-                  <a:tcPr marL="91450" marR="91450" marT="45725" marB="45725"/>
+                  <a:tcPr marL="91450" marR="91450" marT="45725" marB="45725">
+                    <a:solidFill>
+                      <a:schemeClr val="accent5"/>
+                    </a:solidFill>
+                  </a:tcPr>
                 </a:tc>
                 <a:tc>
                   <a:txBody>
@@ -16385,7 +16949,11 @@
                       </a:endParaRPr>
                     </a:p>
                   </a:txBody>
-                  <a:tcPr marL="91450" marR="91450" marT="45725" marB="45725"/>
+                  <a:tcPr marL="91450" marR="91450" marT="45725" marB="45725">
+                    <a:solidFill>
+                      <a:schemeClr val="accent5"/>
+                    </a:solidFill>
+                  </a:tcPr>
                 </a:tc>
                 <a:tc>
                   <a:txBody>
@@ -16419,7 +16987,11 @@
                       </a:endParaRPr>
                     </a:p>
                   </a:txBody>
-                  <a:tcPr marL="91450" marR="91450" marT="45725" marB="45725"/>
+                  <a:tcPr marL="91450" marR="91450" marT="45725" marB="45725">
+                    <a:solidFill>
+                      <a:schemeClr val="accent5"/>
+                    </a:solidFill>
+                  </a:tcPr>
                 </a:tc>
                 <a:tc>
                   <a:txBody>
@@ -16453,7 +17025,11 @@
                       </a:endParaRPr>
                     </a:p>
                   </a:txBody>
-                  <a:tcPr marL="91450" marR="91450" marT="45725" marB="45725"/>
+                  <a:tcPr marL="91450" marR="91450" marT="45725" marB="45725">
+                    <a:solidFill>
+                      <a:schemeClr val="accent5"/>
+                    </a:solidFill>
+                  </a:tcPr>
                 </a:tc>
                 <a:extLst>
                   <a:ext uri="{0D108BD9-81ED-4DB2-BD59-A6C34878D82A}">
@@ -16486,7 +17062,11 @@
                       <a:endParaRPr sz="1800" u="none" strike="noStrike" cap="none" dirty="0"/>
                     </a:p>
                   </a:txBody>
-                  <a:tcPr marL="91450" marR="91450" marT="45725" marB="45725" anchor="ctr"/>
+                  <a:tcPr marL="91450" marR="91450" marT="45725" marB="45725" anchor="ctr">
+                    <a:solidFill>
+                      <a:schemeClr val="accent5"/>
+                    </a:solidFill>
+                  </a:tcPr>
                 </a:tc>
                 <a:tc>
                   <a:txBody>
@@ -16531,7 +17111,11 @@
                       <a:endParaRPr sz="1800" u="none" strike="noStrike" cap="none" dirty="0"/>
                     </a:p>
                   </a:txBody>
-                  <a:tcPr marL="91450" marR="91450" marT="45725" marB="45725" anchor="ctr"/>
+                  <a:tcPr marL="91450" marR="91450" marT="45725" marB="45725" anchor="ctr">
+                    <a:solidFill>
+                      <a:schemeClr val="accent5"/>
+                    </a:solidFill>
+                  </a:tcPr>
                 </a:tc>
                 <a:tc>
                   <a:txBody>
@@ -16561,7 +17145,11 @@
                       <a:endParaRPr sz="1800" u="none" strike="noStrike" cap="none" dirty="0"/>
                     </a:p>
                   </a:txBody>
-                  <a:tcPr marL="91450" marR="91450" marT="45725" marB="45725" anchor="ctr"/>
+                  <a:tcPr marL="91450" marR="91450" marT="45725" marB="45725" anchor="ctr">
+                    <a:solidFill>
+                      <a:schemeClr val="accent5"/>
+                    </a:solidFill>
+                  </a:tcPr>
                 </a:tc>
                 <a:tc>
                   <a:txBody>
@@ -16581,13 +17169,17 @@
                         <a:buNone/>
                       </a:pPr>
                       <a:r>
-                        <a:rPr lang="en-US" sz="1800" u="none" strike="noStrike" cap="none" dirty="0"/>
+                        <a:rPr lang="en-US" sz="1800" u="none" strike="noStrike" cap="none"/>
                         <a:t>17/02/2023</a:t>
                       </a:r>
-                      <a:endParaRPr sz="1800" u="none" strike="noStrike" cap="none" dirty="0"/>
+                      <a:endParaRPr sz="1800" u="none" strike="noStrike" cap="none"/>
                     </a:p>
                   </a:txBody>
-                  <a:tcPr marL="91450" marR="91450" marT="45725" marB="45725" anchor="ctr"/>
+                  <a:tcPr marL="91450" marR="91450" marT="45725" marB="45725" anchor="ctr">
+                    <a:solidFill>
+                      <a:schemeClr val="accent5"/>
+                    </a:solidFill>
+                  </a:tcPr>
                 </a:tc>
                 <a:extLst>
                   <a:ext uri="{0D108BD9-81ED-4DB2-BD59-A6C34878D82A}">
@@ -16614,17 +17206,21 @@
                         <a:buNone/>
                       </a:pPr>
                       <a:r>
-                        <a:rPr lang="en-US" sz="1800" dirty="0"/>
+                        <a:rPr lang="en-US" sz="1800"/>
                         <a:t>Module </a:t>
                       </a:r>
                       <a:r>
-                        <a:rPr lang="en-US" sz="1800" u="none" strike="noStrike" cap="none" dirty="0"/>
+                        <a:rPr lang="en-US" sz="1800" u="none" strike="noStrike" cap="none"/>
                         <a:t>2</a:t>
                       </a:r>
-                      <a:endParaRPr sz="1800" u="none" strike="noStrike" cap="none" dirty="0"/>
+                      <a:endParaRPr sz="1800" u="none" strike="noStrike" cap="none"/>
                     </a:p>
                   </a:txBody>
-                  <a:tcPr marL="91450" marR="91450" marT="45725" marB="45725" anchor="ctr"/>
+                  <a:tcPr marL="91450" marR="91450" marT="45725" marB="45725" anchor="ctr">
+                    <a:solidFill>
+                      <a:schemeClr val="accent5"/>
+                    </a:solidFill>
+                  </a:tcPr>
                 </a:tc>
                 <a:tc>
                   <a:txBody>
@@ -16645,12 +17241,16 @@
                       </a:pPr>
                       <a:r>
                         <a:rPr lang="en-US" sz="1800" u="none" strike="noStrike" cap="none" dirty="0"/>
-                        <a:t>Processing data </a:t>
+                        <a:t>Data Pre -processing</a:t>
                       </a:r>
                       <a:endParaRPr sz="1800" u="none" strike="noStrike" cap="none" dirty="0"/>
                     </a:p>
                   </a:txBody>
-                  <a:tcPr marL="91450" marR="91450" marT="45725" marB="45725" anchor="ctr"/>
+                  <a:tcPr marL="91450" marR="91450" marT="45725" marB="45725" anchor="ctr">
+                    <a:solidFill>
+                      <a:schemeClr val="accent5"/>
+                    </a:solidFill>
+                  </a:tcPr>
                 </a:tc>
                 <a:tc>
                   <a:txBody>
@@ -16676,7 +17276,11 @@
                       <a:endParaRPr sz="1600" u="none" strike="noStrike" cap="none" dirty="0"/>
                     </a:p>
                   </a:txBody>
-                  <a:tcPr marL="91450" marR="91450" marT="45725" marB="45725" anchor="ctr"/>
+                  <a:tcPr marL="91450" marR="91450" marT="45725" marB="45725" anchor="ctr">
+                    <a:solidFill>
+                      <a:schemeClr val="accent5"/>
+                    </a:solidFill>
+                  </a:tcPr>
                 </a:tc>
                 <a:tc>
                   <a:txBody>
@@ -16696,13 +17300,17 @@
                         <a:buNone/>
                       </a:pPr>
                       <a:r>
-                        <a:rPr lang="en-US" sz="1800" u="none" strike="noStrike" cap="none" dirty="0"/>
+                        <a:rPr lang="en-US" sz="1800" u="none" strike="noStrike" cap="none"/>
                         <a:t>24/02/2023</a:t>
                       </a:r>
-                      <a:endParaRPr sz="1800" u="none" strike="noStrike" cap="none" dirty="0"/>
+                      <a:endParaRPr sz="1800" u="none" strike="noStrike" cap="none"/>
                     </a:p>
                   </a:txBody>
-                  <a:tcPr marL="91450" marR="91450" marT="45725" marB="45725" anchor="ctr"/>
+                  <a:tcPr marL="91450" marR="91450" marT="45725" marB="45725" anchor="ctr">
+                    <a:solidFill>
+                      <a:schemeClr val="accent5"/>
+                    </a:solidFill>
+                  </a:tcPr>
                 </a:tc>
                 <a:extLst>
                   <a:ext uri="{0D108BD9-81ED-4DB2-BD59-A6C34878D82A}">
@@ -16739,7 +17347,11 @@
                       <a:endParaRPr sz="1800" u="none" strike="noStrike" cap="none" dirty="0"/>
                     </a:p>
                   </a:txBody>
-                  <a:tcPr marL="91450" marR="91450" marT="45725" marB="45725" anchor="ctr"/>
+                  <a:tcPr marL="91450" marR="91450" marT="45725" marB="45725" anchor="ctr">
+                    <a:solidFill>
+                      <a:schemeClr val="accent5"/>
+                    </a:solidFill>
+                  </a:tcPr>
                 </a:tc>
                 <a:tc>
                   <a:txBody>
@@ -16765,7 +17377,11 @@
                       <a:endParaRPr sz="1800" u="none" strike="noStrike" cap="none" dirty="0"/>
                     </a:p>
                   </a:txBody>
-                  <a:tcPr marL="91450" marR="91450" marT="45725" marB="45725" anchor="ctr"/>
+                  <a:tcPr marL="91450" marR="91450" marT="45725" marB="45725" anchor="ctr">
+                    <a:solidFill>
+                      <a:schemeClr val="accent5"/>
+                    </a:solidFill>
+                  </a:tcPr>
                 </a:tc>
                 <a:tc>
                   <a:txBody>
@@ -16791,7 +17407,11 @@
                       <a:endParaRPr sz="1600" u="none" strike="noStrike" cap="none" dirty="0"/>
                     </a:p>
                   </a:txBody>
-                  <a:tcPr marL="91450" marR="91450" marT="45725" marB="45725" anchor="ctr"/>
+                  <a:tcPr marL="91450" marR="91450" marT="45725" marB="45725" anchor="ctr">
+                    <a:solidFill>
+                      <a:schemeClr val="accent5"/>
+                    </a:solidFill>
+                  </a:tcPr>
                 </a:tc>
                 <a:tc>
                   <a:txBody>
@@ -16811,13 +17431,17 @@
                         <a:buNone/>
                       </a:pPr>
                       <a:r>
-                        <a:rPr lang="en-US" sz="1800" u="none" strike="noStrike" cap="none" dirty="0"/>
+                        <a:rPr lang="en-US" sz="1800" u="none" strike="noStrike" cap="none"/>
                         <a:t>03/03/2023</a:t>
                       </a:r>
-                      <a:endParaRPr sz="1800" u="none" strike="noStrike" cap="none" dirty="0"/>
+                      <a:endParaRPr sz="1800" u="none" strike="noStrike" cap="none"/>
                     </a:p>
                   </a:txBody>
-                  <a:tcPr marL="91450" marR="91450" marT="45725" marB="45725" anchor="ctr"/>
+                  <a:tcPr marL="91450" marR="91450" marT="45725" marB="45725" anchor="ctr">
+                    <a:solidFill>
+                      <a:schemeClr val="accent5"/>
+                    </a:solidFill>
+                  </a:tcPr>
                 </a:tc>
                 <a:extLst>
                   <a:ext uri="{0D108BD9-81ED-4DB2-BD59-A6C34878D82A}">
@@ -16854,7 +17478,11 @@
                       <a:endParaRPr sz="1800" u="none" strike="noStrike" cap="none"/>
                     </a:p>
                   </a:txBody>
-                  <a:tcPr marL="91450" marR="91450" marT="45725" marB="45725" anchor="ctr"/>
+                  <a:tcPr marL="91450" marR="91450" marT="45725" marB="45725" anchor="ctr">
+                    <a:solidFill>
+                      <a:schemeClr val="accent5"/>
+                    </a:solidFill>
+                  </a:tcPr>
                 </a:tc>
                 <a:tc>
                   <a:txBody>
@@ -16880,7 +17508,11 @@
                       <a:endParaRPr sz="1800" u="none" strike="noStrike" cap="none" dirty="0"/>
                     </a:p>
                   </a:txBody>
-                  <a:tcPr marL="91450" marR="91450" marT="45725" marB="45725" anchor="ctr"/>
+                  <a:tcPr marL="91450" marR="91450" marT="45725" marB="45725" anchor="ctr">
+                    <a:solidFill>
+                      <a:schemeClr val="accent5"/>
+                    </a:solidFill>
+                  </a:tcPr>
                 </a:tc>
                 <a:tc>
                   <a:txBody>
@@ -16900,13 +17532,17 @@
                         <a:buNone/>
                       </a:pPr>
                       <a:r>
-                        <a:rPr lang="en-US" sz="1600" u="none" strike="noStrike" cap="none" dirty="0"/>
+                        <a:rPr lang="en-US" sz="1600" u="none" strike="noStrike" cap="none"/>
                         <a:t>Model will be trained and tested numerous times</a:t>
                       </a:r>
-                      <a:endParaRPr sz="1600" u="none" strike="noStrike" cap="none" dirty="0"/>
+                      <a:endParaRPr sz="1600" u="none" strike="noStrike" cap="none"/>
                     </a:p>
                   </a:txBody>
-                  <a:tcPr marL="91450" marR="91450" marT="45725" marB="45725" anchor="ctr"/>
+                  <a:tcPr marL="91450" marR="91450" marT="45725" marB="45725" anchor="ctr">
+                    <a:solidFill>
+                      <a:schemeClr val="accent5"/>
+                    </a:solidFill>
+                  </a:tcPr>
                 </a:tc>
                 <a:tc>
                   <a:txBody>
@@ -16926,13 +17562,17 @@
                         <a:buNone/>
                       </a:pPr>
                       <a:r>
-                        <a:rPr lang="en-US" sz="1800" u="none" strike="noStrike" cap="none" dirty="0"/>
+                        <a:rPr lang="en-US" sz="1800" u="none" strike="noStrike" cap="none"/>
                         <a:t>17/03/2023</a:t>
                       </a:r>
-                      <a:endParaRPr sz="1800" u="none" strike="noStrike" cap="none" dirty="0"/>
+                      <a:endParaRPr sz="1800" u="none" strike="noStrike" cap="none"/>
                     </a:p>
                   </a:txBody>
-                  <a:tcPr marL="91450" marR="91450" marT="45725" marB="45725" anchor="ctr"/>
+                  <a:tcPr marL="91450" marR="91450" marT="45725" marB="45725" anchor="ctr">
+                    <a:solidFill>
+                      <a:schemeClr val="accent5"/>
+                    </a:solidFill>
+                  </a:tcPr>
                 </a:tc>
                 <a:extLst>
                   <a:ext uri="{0D108BD9-81ED-4DB2-BD59-A6C34878D82A}">
@@ -16969,7 +17609,11 @@
                       <a:endParaRPr sz="1800" u="none" strike="noStrike" cap="none"/>
                     </a:p>
                   </a:txBody>
-                  <a:tcPr marL="91450" marR="91450" marT="45725" marB="45725" anchor="ctr"/>
+                  <a:tcPr marL="91450" marR="91450" marT="45725" marB="45725" anchor="ctr">
+                    <a:solidFill>
+                      <a:schemeClr val="accent5"/>
+                    </a:solidFill>
+                  </a:tcPr>
                 </a:tc>
                 <a:tc>
                   <a:txBody>
@@ -16995,7 +17639,11 @@
                       <a:endParaRPr sz="1800" u="none" strike="noStrike" cap="none" dirty="0"/>
                     </a:p>
                   </a:txBody>
-                  <a:tcPr marL="91450" marR="91450" marT="45725" marB="45725" anchor="ctr"/>
+                  <a:tcPr marL="91450" marR="91450" marT="45725" marB="45725" anchor="ctr">
+                    <a:solidFill>
+                      <a:schemeClr val="accent5"/>
+                    </a:solidFill>
+                  </a:tcPr>
                 </a:tc>
                 <a:tc>
                   <a:txBody>
@@ -17015,13 +17663,17 @@
                         <a:buNone/>
                       </a:pPr>
                       <a:r>
-                        <a:rPr lang="en-US" sz="1600" u="none" strike="noStrike" cap="none" dirty="0"/>
+                        <a:rPr lang="en-US" sz="1600" u="none" strike="noStrike" cap="none"/>
                         <a:t>Integrating the model with the mobile application</a:t>
                       </a:r>
-                      <a:endParaRPr sz="1600" u="none" strike="noStrike" cap="none" dirty="0"/>
+                      <a:endParaRPr sz="1600" u="none" strike="noStrike" cap="none"/>
                     </a:p>
                   </a:txBody>
-                  <a:tcPr marL="91450" marR="91450" marT="45725" marB="45725" anchor="ctr"/>
+                  <a:tcPr marL="91450" marR="91450" marT="45725" marB="45725" anchor="ctr">
+                    <a:solidFill>
+                      <a:schemeClr val="accent5"/>
+                    </a:solidFill>
+                  </a:tcPr>
                 </a:tc>
                 <a:tc>
                   <a:txBody>
@@ -17041,13 +17693,17 @@
                         <a:buNone/>
                       </a:pPr>
                       <a:r>
-                        <a:rPr lang="en-US" sz="1800" u="none" strike="noStrike" cap="none" dirty="0"/>
+                        <a:rPr lang="en-US" sz="1800" u="none" strike="noStrike" cap="none"/>
                         <a:t>24/03/2023</a:t>
                       </a:r>
-                      <a:endParaRPr sz="1800" u="none" strike="noStrike" cap="none" dirty="0"/>
+                      <a:endParaRPr sz="1800" u="none" strike="noStrike" cap="none"/>
                     </a:p>
                   </a:txBody>
-                  <a:tcPr marL="91450" marR="91450" marT="45725" marB="45725" anchor="ctr"/>
+                  <a:tcPr marL="91450" marR="91450" marT="45725" marB="45725" anchor="ctr">
+                    <a:solidFill>
+                      <a:schemeClr val="accent5"/>
+                    </a:solidFill>
+                  </a:tcPr>
                 </a:tc>
                 <a:extLst>
                   <a:ext uri="{0D108BD9-81ED-4DB2-BD59-A6C34878D82A}">
@@ -17074,17 +17730,21 @@
                         <a:buNone/>
                       </a:pPr>
                       <a:r>
-                        <a:rPr lang="en-US" sz="1800"/>
+                        <a:rPr lang="en-US" sz="1800" dirty="0"/>
                         <a:t>Module </a:t>
                       </a:r>
                       <a:r>
-                        <a:rPr lang="en-US" sz="1800" u="none" strike="noStrike" cap="none"/>
+                        <a:rPr lang="en-US" sz="1800" u="none" strike="noStrike" cap="none" dirty="0"/>
                         <a:t>6</a:t>
                       </a:r>
-                      <a:endParaRPr sz="1800" u="none" strike="noStrike" cap="none"/>
+                      <a:endParaRPr sz="1800" u="none" strike="noStrike" cap="none" dirty="0"/>
                     </a:p>
                   </a:txBody>
-                  <a:tcPr marL="91450" marR="91450" marT="45725" marB="45725" anchor="ctr"/>
+                  <a:tcPr marL="91450" marR="91450" marT="45725" marB="45725" anchor="ctr">
+                    <a:solidFill>
+                      <a:schemeClr val="accent5"/>
+                    </a:solidFill>
+                  </a:tcPr>
                 </a:tc>
                 <a:tc>
                   <a:txBody>
@@ -17104,13 +17764,17 @@
                         <a:buNone/>
                       </a:pPr>
                       <a:r>
-                        <a:rPr lang="en-US" sz="1800" u="none" strike="noStrike" cap="none"/>
-                        <a:t>Deploy the web app</a:t>
+                        <a:rPr lang="en-US" sz="1800" u="none" strike="noStrike" cap="none" dirty="0"/>
+                        <a:t>Deploy the app</a:t>
                       </a:r>
-                      <a:endParaRPr sz="1800" u="none" strike="noStrike" cap="none"/>
+                      <a:endParaRPr sz="1800" u="none" strike="noStrike" cap="none" dirty="0"/>
                     </a:p>
                   </a:txBody>
-                  <a:tcPr marL="91450" marR="91450" marT="45725" marB="45725" anchor="ctr"/>
+                  <a:tcPr marL="91450" marR="91450" marT="45725" marB="45725" anchor="ctr">
+                    <a:solidFill>
+                      <a:schemeClr val="accent5"/>
+                    </a:solidFill>
+                  </a:tcPr>
                 </a:tc>
                 <a:tc>
                   <a:txBody>
@@ -17130,13 +17794,17 @@
                         <a:buNone/>
                       </a:pPr>
                       <a:r>
-                        <a:rPr lang="en-US" sz="1600" u="none" strike="noStrike" cap="none" dirty="0"/>
+                        <a:rPr lang="en-US" sz="1600" u="none" strike="noStrike" cap="none"/>
                         <a:t>Making the model available to the users through a application</a:t>
                       </a:r>
-                      <a:endParaRPr sz="1600" u="none" strike="noStrike" cap="none" dirty="0"/>
+                      <a:endParaRPr sz="1600" u="none" strike="noStrike" cap="none"/>
                     </a:p>
                   </a:txBody>
-                  <a:tcPr marL="91450" marR="91450" marT="45725" marB="45725" anchor="ctr"/>
+                  <a:tcPr marL="91450" marR="91450" marT="45725" marB="45725" anchor="ctr">
+                    <a:solidFill>
+                      <a:schemeClr val="accent5"/>
+                    </a:solidFill>
+                  </a:tcPr>
                 </a:tc>
                 <a:tc>
                   <a:txBody>
@@ -17162,7 +17830,11 @@
                       <a:endParaRPr sz="1800" u="none" strike="noStrike" cap="none" dirty="0"/>
                     </a:p>
                   </a:txBody>
-                  <a:tcPr marL="91450" marR="91450" marT="45725" marB="45725" anchor="ctr"/>
+                  <a:tcPr marL="91450" marR="91450" marT="45725" marB="45725" anchor="ctr">
+                    <a:solidFill>
+                      <a:schemeClr val="accent5"/>
+                    </a:solidFill>
+                  </a:tcPr>
                 </a:tc>
                 <a:extLst>
                   <a:ext uri="{0D108BD9-81ED-4DB2-BD59-A6C34878D82A}">
@@ -17175,6 +17847,11 @@
         </a:graphic>
       </p:graphicFrame>
     </p:spTree>
+    <p:extLst>
+      <p:ext uri="{BB962C8B-B14F-4D97-AF65-F5344CB8AC3E}">
+        <p14:creationId xmlns:p14="http://schemas.microsoft.com/office/powerpoint/2010/main" val="1660083507"/>
+      </p:ext>
+    </p:extLst>
   </p:cSld>
   <p:clrMapOvr>
     <a:masterClrMapping/>
@@ -17182,7 +17859,7 @@
 </p:sld>
 </file>
 
-<file path=ppt/slides/slide12.xml><?xml version="1.0" encoding="utf-8"?>
+<file path=ppt/slides/slide15.xml><?xml version="1.0" encoding="utf-8"?>
 <p:sld xmlns:a="http://schemas.openxmlformats.org/drawingml/2006/main" xmlns:r="http://schemas.openxmlformats.org/officeDocument/2006/relationships" xmlns:p="http://schemas.openxmlformats.org/presentationml/2006/main">
   <p:cSld>
     <p:spTree>
@@ -17201,35 +17878,6 @@
       </p:grpSpPr>
       <p:sp>
         <p:nvSpPr>
-          <p:cNvPr id="2" name="Title 1">
-            <a:extLst>
-              <a:ext uri="{FF2B5EF4-FFF2-40B4-BE49-F238E27FC236}">
-                <a16:creationId xmlns:a16="http://schemas.microsoft.com/office/drawing/2014/main" id="{F74E3FE6-7766-56A9-803A-F44F971BFDBB}"/>
-              </a:ext>
-            </a:extLst>
-          </p:cNvPr>
-          <p:cNvSpPr>
-            <a:spLocks noGrp="1"/>
-          </p:cNvSpPr>
-          <p:nvPr>
-            <p:ph type="title"/>
-          </p:nvPr>
-        </p:nvSpPr>
-        <p:spPr/>
-        <p:txBody>
-          <a:bodyPr/>
-          <a:lstStyle/>
-          <a:p>
-            <a:r>
-              <a:rPr lang="en-US" dirty="0"/>
-              <a:t>% of Work Completed</a:t>
-            </a:r>
-            <a:endParaRPr lang="en-IN" dirty="0"/>
-          </a:p>
-        </p:txBody>
-      </p:sp>
-      <p:sp>
-        <p:nvSpPr>
           <p:cNvPr id="3" name="Text Placeholder 2">
             <a:extLst>
               <a:ext uri="{FF2B5EF4-FFF2-40B4-BE49-F238E27FC236}">
@@ -17244,16 +17892,375 @@
             <p:ph type="body" idx="1"/>
           </p:nvPr>
         </p:nvSpPr>
-        <p:spPr/>
+        <p:spPr>
+          <a:xfrm>
+            <a:off x="838200" y="1724025"/>
+            <a:ext cx="10515600" cy="4351338"/>
+          </a:xfrm>
+        </p:spPr>
         <p:txBody>
           <a:bodyPr/>
           <a:lstStyle/>
           <a:p>
+            <a:pPr marL="114300" indent="0">
+              <a:buNone/>
+            </a:pPr>
             <a:r>
               <a:rPr lang="en-US" dirty="0"/>
-              <a:t>Completion of work is:- 30%</a:t>
+              <a:t>We have completed about 25% of work till now. Which includes the processes mentioned below,</a:t>
             </a:r>
-            <a:endParaRPr lang="en-IN" dirty="0"/>
+          </a:p>
+          <a:p>
+            <a:r>
+              <a:rPr lang="en-IN" sz="1800" b="0" i="0" u="none" strike="noStrike" dirty="0">
+                <a:solidFill>
+                  <a:srgbClr val="000000"/>
+                </a:solidFill>
+                <a:effectLst/>
+                <a:latin typeface="Arial" panose="020B0604020202020204" pitchFamily="34" charset="0"/>
+              </a:rPr>
+              <a:t>finding dataset</a:t>
+            </a:r>
+            <a:endParaRPr lang="en-US" sz="1800" b="0" i="0" u="none" strike="noStrike" dirty="0">
+              <a:solidFill>
+                <a:srgbClr val="000000"/>
+              </a:solidFill>
+              <a:effectLst/>
+              <a:latin typeface="Arial" panose="020B0604020202020204" pitchFamily="34" charset="0"/>
+            </a:endParaRPr>
+          </a:p>
+          <a:p>
+            <a:r>
+              <a:rPr lang="en-US" sz="1800" dirty="0">
+                <a:solidFill>
+                  <a:srgbClr val="000000"/>
+                </a:solidFill>
+                <a:latin typeface="Arial" panose="020B0604020202020204" pitchFamily="34" charset="0"/>
+              </a:rPr>
+              <a:t>Analysis the dataset </a:t>
+            </a:r>
+          </a:p>
+          <a:p>
+            <a:r>
+              <a:rPr lang="en-US" sz="1800" dirty="0">
+                <a:solidFill>
+                  <a:srgbClr val="000000"/>
+                </a:solidFill>
+                <a:latin typeface="Arial" panose="020B0604020202020204" pitchFamily="34" charset="0"/>
+              </a:rPr>
+              <a:t>Cleaning the dataset</a:t>
+            </a:r>
+          </a:p>
+          <a:p>
+            <a:r>
+              <a:rPr lang="en-US" sz="1800" dirty="0">
+                <a:solidFill>
+                  <a:srgbClr val="000000"/>
+                </a:solidFill>
+                <a:latin typeface="Arial" panose="020B0604020202020204" pitchFamily="34" charset="0"/>
+              </a:rPr>
+              <a:t>Normalizing the dataset based on the formula</a:t>
+            </a:r>
+          </a:p>
+          <a:p>
+            <a:r>
+              <a:rPr lang="en-US" sz="1800" dirty="0">
+                <a:solidFill>
+                  <a:srgbClr val="000000"/>
+                </a:solidFill>
+                <a:latin typeface="Arial" panose="020B0604020202020204" pitchFamily="34" charset="0"/>
+              </a:rPr>
+              <a:t>Currently testing the dataset on KNN-Model and Support Vector Classifier (SVC) model</a:t>
+            </a:r>
+          </a:p>
+        </p:txBody>
+      </p:sp>
+      <p:sp>
+        <p:nvSpPr>
+          <p:cNvPr id="7" name="Google Shape;142;p23">
+            <a:extLst>
+              <a:ext uri="{FF2B5EF4-FFF2-40B4-BE49-F238E27FC236}">
+                <a16:creationId xmlns:a16="http://schemas.microsoft.com/office/drawing/2014/main" id="{D2175C00-593E-C16D-0994-ED883FB7BA16}"/>
+              </a:ext>
+            </a:extLst>
+          </p:cNvPr>
+          <p:cNvSpPr txBox="1">
+            <a:spLocks/>
+          </p:cNvSpPr>
+          <p:nvPr/>
+        </p:nvSpPr>
+        <p:spPr>
+          <a:xfrm>
+            <a:off x="838200" y="450189"/>
+            <a:ext cx="10515600" cy="1006471"/>
+          </a:xfrm>
+          <a:prstGeom prst="rect">
+            <a:avLst/>
+          </a:prstGeom>
+          <a:noFill/>
+          <a:ln>
+            <a:noFill/>
+          </a:ln>
+        </p:spPr>
+        <p:txBody>
+          <a:bodyPr spcFirstLastPara="1" wrap="square" lIns="91425" tIns="45700" rIns="91425" bIns="45700" anchor="ctr" anchorCtr="0">
+            <a:normAutofit/>
+          </a:bodyPr>
+          <a:lstStyle>
+            <a:defPPr marR="0" lvl="0" algn="l" rtl="0">
+              <a:lnSpc>
+                <a:spcPct val="100000"/>
+              </a:lnSpc>
+              <a:spcBef>
+                <a:spcPts val="0"/>
+              </a:spcBef>
+              <a:spcAft>
+                <a:spcPts val="0"/>
+              </a:spcAft>
+            </a:defPPr>
+            <a:lvl1pPr marR="0" lvl="0" algn="ctr" rtl="0">
+              <a:lnSpc>
+                <a:spcPct val="90000"/>
+              </a:lnSpc>
+              <a:spcBef>
+                <a:spcPts val="0"/>
+              </a:spcBef>
+              <a:spcAft>
+                <a:spcPts val="0"/>
+              </a:spcAft>
+              <a:buClr>
+                <a:schemeClr val="dk1"/>
+              </a:buClr>
+              <a:buSzPts val="6000"/>
+              <a:buFont typeface="Calibri"/>
+              <a:buNone/>
+              <a:defRPr sz="6000" b="0" i="0" u="none" strike="noStrike" cap="none">
+                <a:solidFill>
+                  <a:schemeClr val="dk1"/>
+                </a:solidFill>
+                <a:latin typeface="Calibri"/>
+                <a:ea typeface="Calibri"/>
+                <a:cs typeface="Calibri"/>
+                <a:sym typeface="Calibri"/>
+              </a:defRPr>
+            </a:lvl1pPr>
+            <a:lvl2pPr marR="0" lvl="1" algn="l" rtl="0">
+              <a:lnSpc>
+                <a:spcPct val="100000"/>
+              </a:lnSpc>
+              <a:spcBef>
+                <a:spcPts val="0"/>
+              </a:spcBef>
+              <a:spcAft>
+                <a:spcPts val="0"/>
+              </a:spcAft>
+              <a:buClr>
+                <a:srgbClr val="000000"/>
+              </a:buClr>
+              <a:buSzPts val="1400"/>
+              <a:buFont typeface="Arial"/>
+              <a:buNone/>
+              <a:defRPr sz="1800" b="0" i="0" u="none" strike="noStrike" cap="none">
+                <a:solidFill>
+                  <a:srgbClr val="000000"/>
+                </a:solidFill>
+                <a:latin typeface="Arial"/>
+                <a:ea typeface="Arial"/>
+                <a:cs typeface="Arial"/>
+                <a:sym typeface="Arial"/>
+              </a:defRPr>
+            </a:lvl2pPr>
+            <a:lvl3pPr marR="0" lvl="2" algn="l" rtl="0">
+              <a:lnSpc>
+                <a:spcPct val="100000"/>
+              </a:lnSpc>
+              <a:spcBef>
+                <a:spcPts val="0"/>
+              </a:spcBef>
+              <a:spcAft>
+                <a:spcPts val="0"/>
+              </a:spcAft>
+              <a:buClr>
+                <a:srgbClr val="000000"/>
+              </a:buClr>
+              <a:buSzPts val="1400"/>
+              <a:buFont typeface="Arial"/>
+              <a:buNone/>
+              <a:defRPr sz="1800" b="0" i="0" u="none" strike="noStrike" cap="none">
+                <a:solidFill>
+                  <a:srgbClr val="000000"/>
+                </a:solidFill>
+                <a:latin typeface="Arial"/>
+                <a:ea typeface="Arial"/>
+                <a:cs typeface="Arial"/>
+                <a:sym typeface="Arial"/>
+              </a:defRPr>
+            </a:lvl3pPr>
+            <a:lvl4pPr marR="0" lvl="3" algn="l" rtl="0">
+              <a:lnSpc>
+                <a:spcPct val="100000"/>
+              </a:lnSpc>
+              <a:spcBef>
+                <a:spcPts val="0"/>
+              </a:spcBef>
+              <a:spcAft>
+                <a:spcPts val="0"/>
+              </a:spcAft>
+              <a:buClr>
+                <a:srgbClr val="000000"/>
+              </a:buClr>
+              <a:buSzPts val="1400"/>
+              <a:buFont typeface="Arial"/>
+              <a:buNone/>
+              <a:defRPr sz="1800" b="0" i="0" u="none" strike="noStrike" cap="none">
+                <a:solidFill>
+                  <a:srgbClr val="000000"/>
+                </a:solidFill>
+                <a:latin typeface="Arial"/>
+                <a:ea typeface="Arial"/>
+                <a:cs typeface="Arial"/>
+                <a:sym typeface="Arial"/>
+              </a:defRPr>
+            </a:lvl4pPr>
+            <a:lvl5pPr marR="0" lvl="4" algn="l" rtl="0">
+              <a:lnSpc>
+                <a:spcPct val="100000"/>
+              </a:lnSpc>
+              <a:spcBef>
+                <a:spcPts val="0"/>
+              </a:spcBef>
+              <a:spcAft>
+                <a:spcPts val="0"/>
+              </a:spcAft>
+              <a:buClr>
+                <a:srgbClr val="000000"/>
+              </a:buClr>
+              <a:buSzPts val="1400"/>
+              <a:buFont typeface="Arial"/>
+              <a:buNone/>
+              <a:defRPr sz="1800" b="0" i="0" u="none" strike="noStrike" cap="none">
+                <a:solidFill>
+                  <a:srgbClr val="000000"/>
+                </a:solidFill>
+                <a:latin typeface="Arial"/>
+                <a:ea typeface="Arial"/>
+                <a:cs typeface="Arial"/>
+                <a:sym typeface="Arial"/>
+              </a:defRPr>
+            </a:lvl5pPr>
+            <a:lvl6pPr marR="0" lvl="5" algn="l" rtl="0">
+              <a:lnSpc>
+                <a:spcPct val="100000"/>
+              </a:lnSpc>
+              <a:spcBef>
+                <a:spcPts val="0"/>
+              </a:spcBef>
+              <a:spcAft>
+                <a:spcPts val="0"/>
+              </a:spcAft>
+              <a:buClr>
+                <a:srgbClr val="000000"/>
+              </a:buClr>
+              <a:buSzPts val="1400"/>
+              <a:buFont typeface="Arial"/>
+              <a:buNone/>
+              <a:defRPr sz="1800" b="0" i="0" u="none" strike="noStrike" cap="none">
+                <a:solidFill>
+                  <a:srgbClr val="000000"/>
+                </a:solidFill>
+                <a:latin typeface="Arial"/>
+                <a:ea typeface="Arial"/>
+                <a:cs typeface="Arial"/>
+                <a:sym typeface="Arial"/>
+              </a:defRPr>
+            </a:lvl6pPr>
+            <a:lvl7pPr marR="0" lvl="6" algn="l" rtl="0">
+              <a:lnSpc>
+                <a:spcPct val="100000"/>
+              </a:lnSpc>
+              <a:spcBef>
+                <a:spcPts val="0"/>
+              </a:spcBef>
+              <a:spcAft>
+                <a:spcPts val="0"/>
+              </a:spcAft>
+              <a:buClr>
+                <a:srgbClr val="000000"/>
+              </a:buClr>
+              <a:buSzPts val="1400"/>
+              <a:buFont typeface="Arial"/>
+              <a:buNone/>
+              <a:defRPr sz="1800" b="0" i="0" u="none" strike="noStrike" cap="none">
+                <a:solidFill>
+                  <a:srgbClr val="000000"/>
+                </a:solidFill>
+                <a:latin typeface="Arial"/>
+                <a:ea typeface="Arial"/>
+                <a:cs typeface="Arial"/>
+                <a:sym typeface="Arial"/>
+              </a:defRPr>
+            </a:lvl7pPr>
+            <a:lvl8pPr marR="0" lvl="7" algn="l" rtl="0">
+              <a:lnSpc>
+                <a:spcPct val="100000"/>
+              </a:lnSpc>
+              <a:spcBef>
+                <a:spcPts val="0"/>
+              </a:spcBef>
+              <a:spcAft>
+                <a:spcPts val="0"/>
+              </a:spcAft>
+              <a:buClr>
+                <a:srgbClr val="000000"/>
+              </a:buClr>
+              <a:buSzPts val="1400"/>
+              <a:buFont typeface="Arial"/>
+              <a:buNone/>
+              <a:defRPr sz="1800" b="0" i="0" u="none" strike="noStrike" cap="none">
+                <a:solidFill>
+                  <a:srgbClr val="000000"/>
+                </a:solidFill>
+                <a:latin typeface="Arial"/>
+                <a:ea typeface="Arial"/>
+                <a:cs typeface="Arial"/>
+                <a:sym typeface="Arial"/>
+              </a:defRPr>
+            </a:lvl8pPr>
+            <a:lvl9pPr marR="0" lvl="8" algn="l" rtl="0">
+              <a:lnSpc>
+                <a:spcPct val="100000"/>
+              </a:lnSpc>
+              <a:spcBef>
+                <a:spcPts val="0"/>
+              </a:spcBef>
+              <a:spcAft>
+                <a:spcPts val="0"/>
+              </a:spcAft>
+              <a:buClr>
+                <a:srgbClr val="000000"/>
+              </a:buClr>
+              <a:buSzPts val="1400"/>
+              <a:buFont typeface="Arial"/>
+              <a:buNone/>
+              <a:defRPr sz="1800" b="0" i="0" u="none" strike="noStrike" cap="none">
+                <a:solidFill>
+                  <a:srgbClr val="000000"/>
+                </a:solidFill>
+                <a:latin typeface="Arial"/>
+                <a:ea typeface="Arial"/>
+                <a:cs typeface="Arial"/>
+                <a:sym typeface="Arial"/>
+              </a:defRPr>
+            </a:lvl9pPr>
+          </a:lstStyle>
+          <a:p>
+            <a:pPr>
+              <a:buSzPts val="1800"/>
+            </a:pPr>
+            <a:r>
+              <a:rPr lang="en-US" sz="5400" dirty="0"/>
+              <a:t>Percentage of work completed</a:t>
+            </a:r>
           </a:p>
         </p:txBody>
       </p:sp>
@@ -17270,7 +18277,7 @@
 </p:sld>
 </file>
 
-<file path=ppt/slides/slide13.xml><?xml version="1.0" encoding="utf-8"?>
+<file path=ppt/slides/slide16.xml><?xml version="1.0" encoding="utf-8"?>
 <p:sld xmlns:a="http://schemas.openxmlformats.org/drawingml/2006/main" xmlns:r="http://schemas.openxmlformats.org/officeDocument/2006/relationships" xmlns:p="http://schemas.openxmlformats.org/presentationml/2006/main">
   <p:cSld>
     <p:spTree>
@@ -17649,7 +18656,7 @@
 </p:sld>
 </file>
 
-<file path=ppt/slides/slide14.xml><?xml version="1.0" encoding="utf-8"?>
+<file path=ppt/slides/slide17.xml><?xml version="1.0" encoding="utf-8"?>
 <p:sld xmlns:a="http://schemas.openxmlformats.org/drawingml/2006/main" xmlns:r="http://schemas.openxmlformats.org/officeDocument/2006/relationships" xmlns:p="http://schemas.openxmlformats.org/presentationml/2006/main">
   <p:cSld>
     <p:spTree>
@@ -17998,7 +19005,358 @@
 </p:sld>
 </file>
 
-<file path=ppt/slides/slide15.xml><?xml version="1.0" encoding="utf-8"?>
+<file path=ppt/slides/slide18.xml><?xml version="1.0" encoding="utf-8"?>
+<p:sld xmlns:a="http://schemas.openxmlformats.org/drawingml/2006/main" xmlns:r="http://schemas.openxmlformats.org/officeDocument/2006/relationships" xmlns:p="http://schemas.openxmlformats.org/presentationml/2006/main">
+  <p:cSld>
+    <p:spTree>
+      <p:nvGrpSpPr>
+        <p:cNvPr id="1" name=""/>
+        <p:cNvGrpSpPr/>
+        <p:nvPr/>
+      </p:nvGrpSpPr>
+      <p:grpSpPr>
+        <a:xfrm>
+          <a:off x="0" y="0"/>
+          <a:ext cx="0" cy="0"/>
+          <a:chOff x="0" y="0"/>
+          <a:chExt cx="0" cy="0"/>
+        </a:xfrm>
+      </p:grpSpPr>
+      <p:sp>
+        <p:nvSpPr>
+          <p:cNvPr id="2" name="Google Shape;142;p23">
+            <a:extLst>
+              <a:ext uri="{FF2B5EF4-FFF2-40B4-BE49-F238E27FC236}">
+                <a16:creationId xmlns:a16="http://schemas.microsoft.com/office/drawing/2014/main" id="{BDE667B6-000A-D96A-5146-C790D5B10E35}"/>
+              </a:ext>
+            </a:extLst>
+          </p:cNvPr>
+          <p:cNvSpPr txBox="1">
+            <a:spLocks/>
+          </p:cNvSpPr>
+          <p:nvPr/>
+        </p:nvSpPr>
+        <p:spPr>
+          <a:xfrm>
+            <a:off x="838200" y="450189"/>
+            <a:ext cx="10515600" cy="1006471"/>
+          </a:xfrm>
+          <a:prstGeom prst="rect">
+            <a:avLst/>
+          </a:prstGeom>
+          <a:noFill/>
+          <a:ln>
+            <a:noFill/>
+          </a:ln>
+        </p:spPr>
+        <p:txBody>
+          <a:bodyPr spcFirstLastPara="1" wrap="square" lIns="91425" tIns="45700" rIns="91425" bIns="45700" anchor="ctr" anchorCtr="0">
+            <a:normAutofit/>
+          </a:bodyPr>
+          <a:lstStyle>
+            <a:defPPr marR="0" lvl="0" algn="l" rtl="0">
+              <a:lnSpc>
+                <a:spcPct val="100000"/>
+              </a:lnSpc>
+              <a:spcBef>
+                <a:spcPts val="0"/>
+              </a:spcBef>
+              <a:spcAft>
+                <a:spcPts val="0"/>
+              </a:spcAft>
+            </a:defPPr>
+            <a:lvl1pPr marR="0" lvl="0" algn="ctr" rtl="0">
+              <a:lnSpc>
+                <a:spcPct val="90000"/>
+              </a:lnSpc>
+              <a:spcBef>
+                <a:spcPts val="0"/>
+              </a:spcBef>
+              <a:spcAft>
+                <a:spcPts val="0"/>
+              </a:spcAft>
+              <a:buClr>
+                <a:schemeClr val="dk1"/>
+              </a:buClr>
+              <a:buSzPts val="6000"/>
+              <a:buFont typeface="Calibri"/>
+              <a:buNone/>
+              <a:defRPr sz="6000" b="0" i="0" u="none" strike="noStrike" cap="none">
+                <a:solidFill>
+                  <a:schemeClr val="dk1"/>
+                </a:solidFill>
+                <a:latin typeface="Calibri"/>
+                <a:ea typeface="Calibri"/>
+                <a:cs typeface="Calibri"/>
+                <a:sym typeface="Calibri"/>
+              </a:defRPr>
+            </a:lvl1pPr>
+            <a:lvl2pPr marR="0" lvl="1" algn="l" rtl="0">
+              <a:lnSpc>
+                <a:spcPct val="100000"/>
+              </a:lnSpc>
+              <a:spcBef>
+                <a:spcPts val="0"/>
+              </a:spcBef>
+              <a:spcAft>
+                <a:spcPts val="0"/>
+              </a:spcAft>
+              <a:buClr>
+                <a:srgbClr val="000000"/>
+              </a:buClr>
+              <a:buSzPts val="1400"/>
+              <a:buFont typeface="Arial"/>
+              <a:buNone/>
+              <a:defRPr sz="1800" b="0" i="0" u="none" strike="noStrike" cap="none">
+                <a:solidFill>
+                  <a:srgbClr val="000000"/>
+                </a:solidFill>
+                <a:latin typeface="Arial"/>
+                <a:ea typeface="Arial"/>
+                <a:cs typeface="Arial"/>
+                <a:sym typeface="Arial"/>
+              </a:defRPr>
+            </a:lvl2pPr>
+            <a:lvl3pPr marR="0" lvl="2" algn="l" rtl="0">
+              <a:lnSpc>
+                <a:spcPct val="100000"/>
+              </a:lnSpc>
+              <a:spcBef>
+                <a:spcPts val="0"/>
+              </a:spcBef>
+              <a:spcAft>
+                <a:spcPts val="0"/>
+              </a:spcAft>
+              <a:buClr>
+                <a:srgbClr val="000000"/>
+              </a:buClr>
+              <a:buSzPts val="1400"/>
+              <a:buFont typeface="Arial"/>
+              <a:buNone/>
+              <a:defRPr sz="1800" b="0" i="0" u="none" strike="noStrike" cap="none">
+                <a:solidFill>
+                  <a:srgbClr val="000000"/>
+                </a:solidFill>
+                <a:latin typeface="Arial"/>
+                <a:ea typeface="Arial"/>
+                <a:cs typeface="Arial"/>
+                <a:sym typeface="Arial"/>
+              </a:defRPr>
+            </a:lvl3pPr>
+            <a:lvl4pPr marR="0" lvl="3" algn="l" rtl="0">
+              <a:lnSpc>
+                <a:spcPct val="100000"/>
+              </a:lnSpc>
+              <a:spcBef>
+                <a:spcPts val="0"/>
+              </a:spcBef>
+              <a:spcAft>
+                <a:spcPts val="0"/>
+              </a:spcAft>
+              <a:buClr>
+                <a:srgbClr val="000000"/>
+              </a:buClr>
+              <a:buSzPts val="1400"/>
+              <a:buFont typeface="Arial"/>
+              <a:buNone/>
+              <a:defRPr sz="1800" b="0" i="0" u="none" strike="noStrike" cap="none">
+                <a:solidFill>
+                  <a:srgbClr val="000000"/>
+                </a:solidFill>
+                <a:latin typeface="Arial"/>
+                <a:ea typeface="Arial"/>
+                <a:cs typeface="Arial"/>
+                <a:sym typeface="Arial"/>
+              </a:defRPr>
+            </a:lvl4pPr>
+            <a:lvl5pPr marR="0" lvl="4" algn="l" rtl="0">
+              <a:lnSpc>
+                <a:spcPct val="100000"/>
+              </a:lnSpc>
+              <a:spcBef>
+                <a:spcPts val="0"/>
+              </a:spcBef>
+              <a:spcAft>
+                <a:spcPts val="0"/>
+              </a:spcAft>
+              <a:buClr>
+                <a:srgbClr val="000000"/>
+              </a:buClr>
+              <a:buSzPts val="1400"/>
+              <a:buFont typeface="Arial"/>
+              <a:buNone/>
+              <a:defRPr sz="1800" b="0" i="0" u="none" strike="noStrike" cap="none">
+                <a:solidFill>
+                  <a:srgbClr val="000000"/>
+                </a:solidFill>
+                <a:latin typeface="Arial"/>
+                <a:ea typeface="Arial"/>
+                <a:cs typeface="Arial"/>
+                <a:sym typeface="Arial"/>
+              </a:defRPr>
+            </a:lvl5pPr>
+            <a:lvl6pPr marR="0" lvl="5" algn="l" rtl="0">
+              <a:lnSpc>
+                <a:spcPct val="100000"/>
+              </a:lnSpc>
+              <a:spcBef>
+                <a:spcPts val="0"/>
+              </a:spcBef>
+              <a:spcAft>
+                <a:spcPts val="0"/>
+              </a:spcAft>
+              <a:buClr>
+                <a:srgbClr val="000000"/>
+              </a:buClr>
+              <a:buSzPts val="1400"/>
+              <a:buFont typeface="Arial"/>
+              <a:buNone/>
+              <a:defRPr sz="1800" b="0" i="0" u="none" strike="noStrike" cap="none">
+                <a:solidFill>
+                  <a:srgbClr val="000000"/>
+                </a:solidFill>
+                <a:latin typeface="Arial"/>
+                <a:ea typeface="Arial"/>
+                <a:cs typeface="Arial"/>
+                <a:sym typeface="Arial"/>
+              </a:defRPr>
+            </a:lvl6pPr>
+            <a:lvl7pPr marR="0" lvl="6" algn="l" rtl="0">
+              <a:lnSpc>
+                <a:spcPct val="100000"/>
+              </a:lnSpc>
+              <a:spcBef>
+                <a:spcPts val="0"/>
+              </a:spcBef>
+              <a:spcAft>
+                <a:spcPts val="0"/>
+              </a:spcAft>
+              <a:buClr>
+                <a:srgbClr val="000000"/>
+              </a:buClr>
+              <a:buSzPts val="1400"/>
+              <a:buFont typeface="Arial"/>
+              <a:buNone/>
+              <a:defRPr sz="1800" b="0" i="0" u="none" strike="noStrike" cap="none">
+                <a:solidFill>
+                  <a:srgbClr val="000000"/>
+                </a:solidFill>
+                <a:latin typeface="Arial"/>
+                <a:ea typeface="Arial"/>
+                <a:cs typeface="Arial"/>
+                <a:sym typeface="Arial"/>
+              </a:defRPr>
+            </a:lvl7pPr>
+            <a:lvl8pPr marR="0" lvl="7" algn="l" rtl="0">
+              <a:lnSpc>
+                <a:spcPct val="100000"/>
+              </a:lnSpc>
+              <a:spcBef>
+                <a:spcPts val="0"/>
+              </a:spcBef>
+              <a:spcAft>
+                <a:spcPts val="0"/>
+              </a:spcAft>
+              <a:buClr>
+                <a:srgbClr val="000000"/>
+              </a:buClr>
+              <a:buSzPts val="1400"/>
+              <a:buFont typeface="Arial"/>
+              <a:buNone/>
+              <a:defRPr sz="1800" b="0" i="0" u="none" strike="noStrike" cap="none">
+                <a:solidFill>
+                  <a:srgbClr val="000000"/>
+                </a:solidFill>
+                <a:latin typeface="Arial"/>
+                <a:ea typeface="Arial"/>
+                <a:cs typeface="Arial"/>
+                <a:sym typeface="Arial"/>
+              </a:defRPr>
+            </a:lvl8pPr>
+            <a:lvl9pPr marR="0" lvl="8" algn="l" rtl="0">
+              <a:lnSpc>
+                <a:spcPct val="100000"/>
+              </a:lnSpc>
+              <a:spcBef>
+                <a:spcPts val="0"/>
+              </a:spcBef>
+              <a:spcAft>
+                <a:spcPts val="0"/>
+              </a:spcAft>
+              <a:buClr>
+                <a:srgbClr val="000000"/>
+              </a:buClr>
+              <a:buSzPts val="1400"/>
+              <a:buFont typeface="Arial"/>
+              <a:buNone/>
+              <a:defRPr sz="1800" b="0" i="0" u="none" strike="noStrike" cap="none">
+                <a:solidFill>
+                  <a:srgbClr val="000000"/>
+                </a:solidFill>
+                <a:latin typeface="Arial"/>
+                <a:ea typeface="Arial"/>
+                <a:cs typeface="Arial"/>
+                <a:sym typeface="Arial"/>
+              </a:defRPr>
+            </a:lvl9pPr>
+          </a:lstStyle>
+          <a:p>
+            <a:pPr>
+              <a:buSzPts val="1800"/>
+            </a:pPr>
+            <a:r>
+              <a:rPr lang="en-US" sz="5400" dirty="0"/>
+              <a:t>Deviation</a:t>
+            </a:r>
+          </a:p>
+        </p:txBody>
+      </p:sp>
+      <p:sp>
+        <p:nvSpPr>
+          <p:cNvPr id="6" name="Text Placeholder 5">
+            <a:extLst>
+              <a:ext uri="{FF2B5EF4-FFF2-40B4-BE49-F238E27FC236}">
+                <a16:creationId xmlns:a16="http://schemas.microsoft.com/office/drawing/2014/main" id="{123A5FF2-76C1-547B-DB89-702F7A598920}"/>
+              </a:ext>
+            </a:extLst>
+          </p:cNvPr>
+          <p:cNvSpPr>
+            <a:spLocks noGrp="1"/>
+          </p:cNvSpPr>
+          <p:nvPr>
+            <p:ph type="body" idx="1"/>
+          </p:nvPr>
+        </p:nvSpPr>
+        <p:spPr/>
+        <p:txBody>
+          <a:bodyPr/>
+          <a:lstStyle/>
+          <a:p>
+            <a:pPr marL="114300" indent="0" algn="ctr">
+              <a:buNone/>
+            </a:pPr>
+            <a:r>
+              <a:rPr lang="en-US" dirty="0"/>
+              <a:t>Till now we have not deviated from our base idea.</a:t>
+            </a:r>
+            <a:endParaRPr lang="en-IN" dirty="0"/>
+          </a:p>
+        </p:txBody>
+      </p:sp>
+    </p:spTree>
+    <p:extLst>
+      <p:ext uri="{BB962C8B-B14F-4D97-AF65-F5344CB8AC3E}">
+        <p14:creationId xmlns:p14="http://schemas.microsoft.com/office/powerpoint/2010/main" val="4209300437"/>
+      </p:ext>
+    </p:extLst>
+  </p:cSld>
+  <p:clrMapOvr>
+    <a:masterClrMapping/>
+  </p:clrMapOvr>
+</p:sld>
+</file>
+
+<file path=ppt/slides/slide19.xml><?xml version="1.0" encoding="utf-8"?>
 <p:sld xmlns:a="http://schemas.openxmlformats.org/drawingml/2006/main" xmlns:r="http://schemas.openxmlformats.org/officeDocument/2006/relationships" xmlns:p="http://schemas.openxmlformats.org/presentationml/2006/main">
   <p:cSld>
     <p:spTree>
@@ -18156,512 +19514,6 @@
               <a:t>2GB storage capacity</a:t>
             </a:r>
             <a:endParaRPr dirty="0"/>
-          </a:p>
-        </p:txBody>
-      </p:sp>
-    </p:spTree>
-  </p:cSld>
-  <p:clrMapOvr>
-    <a:masterClrMapping/>
-  </p:clrMapOvr>
-</p:sld>
-</file>
-
-<file path=ppt/slides/slide16.xml><?xml version="1.0" encoding="utf-8"?>
-<p:sld xmlns:a="http://schemas.openxmlformats.org/drawingml/2006/main" xmlns:r="http://schemas.openxmlformats.org/officeDocument/2006/relationships" xmlns:p="http://schemas.openxmlformats.org/presentationml/2006/main">
-  <p:cSld>
-    <p:spTree>
-      <p:nvGrpSpPr>
-        <p:cNvPr id="1" name="Shape 153"/>
-        <p:cNvGrpSpPr/>
-        <p:nvPr/>
-      </p:nvGrpSpPr>
-      <p:grpSpPr>
-        <a:xfrm>
-          <a:off x="0" y="0"/>
-          <a:ext cx="0" cy="0"/>
-          <a:chOff x="0" y="0"/>
-          <a:chExt cx="0" cy="0"/>
-        </a:xfrm>
-      </p:grpSpPr>
-      <p:sp>
-        <p:nvSpPr>
-          <p:cNvPr id="154" name="Google Shape;154;p25"/>
-          <p:cNvSpPr txBox="1">
-            <a:spLocks noGrp="1"/>
-          </p:cNvSpPr>
-          <p:nvPr>
-            <p:ph type="title"/>
-          </p:nvPr>
-        </p:nvSpPr>
-        <p:spPr>
-          <a:xfrm>
-            <a:off x="838200" y="599052"/>
-            <a:ext cx="10515600" cy="770338"/>
-          </a:xfrm>
-          <a:prstGeom prst="rect">
-            <a:avLst/>
-          </a:prstGeom>
-          <a:noFill/>
-          <a:ln>
-            <a:noFill/>
-          </a:ln>
-        </p:spPr>
-        <p:txBody>
-          <a:bodyPr spcFirstLastPara="1" wrap="square" lIns="91425" tIns="45700" rIns="91425" bIns="45700" anchor="ctr" anchorCtr="0">
-            <a:normAutofit fontScale="90000"/>
-          </a:bodyPr>
-          <a:lstStyle/>
-          <a:p>
-            <a:pPr marL="0" lvl="0" indent="0" algn="ctr" rtl="0">
-              <a:lnSpc>
-                <a:spcPct val="90000"/>
-              </a:lnSpc>
-              <a:spcBef>
-                <a:spcPts val="0"/>
-              </a:spcBef>
-              <a:spcAft>
-                <a:spcPts val="0"/>
-              </a:spcAft>
-              <a:buClr>
-                <a:schemeClr val="dk1"/>
-              </a:buClr>
-              <a:buSzPct val="100000"/>
-              <a:buFont typeface="Calibri"/>
-              <a:buNone/>
-            </a:pPr>
-            <a:r>
-              <a:rPr lang="en-US" sz="6000"/>
-              <a:t>Software Requirements</a:t>
-            </a:r>
-            <a:endParaRPr sz="6000"/>
-          </a:p>
-        </p:txBody>
-      </p:sp>
-      <p:sp>
-        <p:nvSpPr>
-          <p:cNvPr id="155" name="Google Shape;155;p25"/>
-          <p:cNvSpPr txBox="1">
-            <a:spLocks noGrp="1"/>
-          </p:cNvSpPr>
-          <p:nvPr>
-            <p:ph type="body" idx="1"/>
-          </p:nvPr>
-        </p:nvSpPr>
-        <p:spPr>
-          <a:xfrm>
-            <a:off x="838200" y="1850066"/>
-            <a:ext cx="10515600" cy="3317359"/>
-          </a:xfrm>
-          <a:prstGeom prst="rect">
-            <a:avLst/>
-          </a:prstGeom>
-          <a:noFill/>
-          <a:ln>
-            <a:noFill/>
-          </a:ln>
-        </p:spPr>
-        <p:txBody>
-          <a:bodyPr spcFirstLastPara="1" wrap="square" lIns="91425" tIns="45700" rIns="91425" bIns="45700" anchor="t" anchorCtr="0">
-            <a:normAutofit/>
-          </a:bodyPr>
-          <a:lstStyle/>
-          <a:p>
-            <a:pPr marL="635000" lvl="0" indent="-457200" algn="just" rtl="0">
-              <a:lnSpc>
-                <a:spcPct val="90000"/>
-              </a:lnSpc>
-              <a:spcBef>
-                <a:spcPts val="0"/>
-              </a:spcBef>
-              <a:spcAft>
-                <a:spcPts val="0"/>
-              </a:spcAft>
-              <a:buSzPts val="2800"/>
-              <a:buChar char="•"/>
-            </a:pPr>
-            <a:r>
-              <a:rPr lang="en-US"/>
-              <a:t>Python</a:t>
-            </a:r>
-            <a:endParaRPr/>
-          </a:p>
-          <a:p>
-            <a:pPr marL="635000" lvl="0" indent="-457200" algn="just" rtl="0">
-              <a:lnSpc>
-                <a:spcPct val="90000"/>
-              </a:lnSpc>
-              <a:spcBef>
-                <a:spcPts val="0"/>
-              </a:spcBef>
-              <a:spcAft>
-                <a:spcPts val="0"/>
-              </a:spcAft>
-              <a:buSzPts val="2800"/>
-              <a:buChar char="•"/>
-            </a:pPr>
-            <a:r>
-              <a:rPr lang="en-US"/>
-              <a:t>Flask</a:t>
-            </a:r>
-            <a:endParaRPr/>
-          </a:p>
-          <a:p>
-            <a:pPr marL="635000" lvl="0" indent="-457200" algn="just" rtl="0">
-              <a:lnSpc>
-                <a:spcPct val="90000"/>
-              </a:lnSpc>
-              <a:spcBef>
-                <a:spcPts val="0"/>
-              </a:spcBef>
-              <a:spcAft>
-                <a:spcPts val="0"/>
-              </a:spcAft>
-              <a:buSzPts val="2800"/>
-              <a:buChar char="•"/>
-            </a:pPr>
-            <a:r>
-              <a:rPr lang="en-US"/>
-              <a:t>Jupyter notebook</a:t>
-            </a:r>
-            <a:endParaRPr/>
-          </a:p>
-          <a:p>
-            <a:pPr marL="635000" lvl="0" indent="-457200" algn="just" rtl="0">
-              <a:lnSpc>
-                <a:spcPct val="90000"/>
-              </a:lnSpc>
-              <a:spcBef>
-                <a:spcPts val="0"/>
-              </a:spcBef>
-              <a:spcAft>
-                <a:spcPts val="0"/>
-              </a:spcAft>
-              <a:buSzPts val="2800"/>
-              <a:buChar char="•"/>
-            </a:pPr>
-            <a:r>
-              <a:rPr lang="en-US"/>
-              <a:t>Visual Studio Code</a:t>
-            </a:r>
-            <a:endParaRPr/>
-          </a:p>
-          <a:p>
-            <a:pPr marL="635000" lvl="0" indent="-457200" algn="just" rtl="0">
-              <a:lnSpc>
-                <a:spcPct val="90000"/>
-              </a:lnSpc>
-              <a:spcBef>
-                <a:spcPts val="0"/>
-              </a:spcBef>
-              <a:spcAft>
-                <a:spcPts val="0"/>
-              </a:spcAft>
-              <a:buSzPts val="2800"/>
-              <a:buChar char="•"/>
-            </a:pPr>
-            <a:r>
-              <a:rPr lang="en-US"/>
-              <a:t>Nodejs</a:t>
-            </a:r>
-            <a:endParaRPr/>
-          </a:p>
-        </p:txBody>
-      </p:sp>
-    </p:spTree>
-  </p:cSld>
-  <p:clrMapOvr>
-    <a:masterClrMapping/>
-  </p:clrMapOvr>
-</p:sld>
-</file>
-
-<file path=ppt/slides/slide17.xml><?xml version="1.0" encoding="utf-8"?>
-<p:sld xmlns:a="http://schemas.openxmlformats.org/drawingml/2006/main" xmlns:r="http://schemas.openxmlformats.org/officeDocument/2006/relationships" xmlns:p="http://schemas.openxmlformats.org/presentationml/2006/main">
-  <p:cSld>
-    <p:spTree>
-      <p:nvGrpSpPr>
-        <p:cNvPr id="1" name="Shape 159"/>
-        <p:cNvGrpSpPr/>
-        <p:nvPr/>
-      </p:nvGrpSpPr>
-      <p:grpSpPr>
-        <a:xfrm>
-          <a:off x="0" y="0"/>
-          <a:ext cx="0" cy="0"/>
-          <a:chOff x="0" y="0"/>
-          <a:chExt cx="0" cy="0"/>
-        </a:xfrm>
-      </p:grpSpPr>
-      <p:sp>
-        <p:nvSpPr>
-          <p:cNvPr id="160" name="Google Shape;160;p8"/>
-          <p:cNvSpPr txBox="1">
-            <a:spLocks noGrp="1"/>
-          </p:cNvSpPr>
-          <p:nvPr>
-            <p:ph type="title"/>
-          </p:nvPr>
-        </p:nvSpPr>
-        <p:spPr>
-          <a:xfrm>
-            <a:off x="838200" y="503349"/>
-            <a:ext cx="10515600" cy="770338"/>
-          </a:xfrm>
-          <a:prstGeom prst="rect">
-            <a:avLst/>
-          </a:prstGeom>
-          <a:noFill/>
-          <a:ln>
-            <a:noFill/>
-          </a:ln>
-        </p:spPr>
-        <p:txBody>
-          <a:bodyPr spcFirstLastPara="1" wrap="square" lIns="91425" tIns="45700" rIns="91425" bIns="45700" anchor="ctr" anchorCtr="0">
-            <a:normAutofit fontScale="90000"/>
-          </a:bodyPr>
-          <a:lstStyle/>
-          <a:p>
-            <a:pPr marL="0" lvl="0" indent="0" algn="ctr" rtl="0">
-              <a:lnSpc>
-                <a:spcPct val="90000"/>
-              </a:lnSpc>
-              <a:spcBef>
-                <a:spcPts val="0"/>
-              </a:spcBef>
-              <a:spcAft>
-                <a:spcPts val="0"/>
-              </a:spcAft>
-              <a:buClr>
-                <a:schemeClr val="dk1"/>
-              </a:buClr>
-              <a:buSzPct val="100000"/>
-              <a:buFont typeface="Calibri"/>
-              <a:buNone/>
-            </a:pPr>
-            <a:r>
-              <a:rPr lang="en-US" sz="6000"/>
-              <a:t>Paper References</a:t>
-            </a:r>
-            <a:endParaRPr sz="6000"/>
-          </a:p>
-        </p:txBody>
-      </p:sp>
-      <p:sp>
-        <p:nvSpPr>
-          <p:cNvPr id="161" name="Google Shape;161;p8"/>
-          <p:cNvSpPr txBox="1">
-            <a:spLocks noGrp="1"/>
-          </p:cNvSpPr>
-          <p:nvPr>
-            <p:ph type="body" idx="1"/>
-          </p:nvPr>
-        </p:nvSpPr>
-        <p:spPr>
-          <a:xfrm>
-            <a:off x="838200" y="1509823"/>
-            <a:ext cx="10515600" cy="4844828"/>
-          </a:xfrm>
-          <a:prstGeom prst="rect">
-            <a:avLst/>
-          </a:prstGeom>
-          <a:noFill/>
-          <a:ln>
-            <a:noFill/>
-          </a:ln>
-        </p:spPr>
-        <p:txBody>
-          <a:bodyPr spcFirstLastPara="1" wrap="square" lIns="91425" tIns="45700" rIns="91425" bIns="45700" anchor="t" anchorCtr="0">
-            <a:normAutofit/>
-          </a:bodyPr>
-          <a:lstStyle/>
-          <a:p>
-            <a:pPr marL="571500" lvl="0" indent="-457200" algn="l" rtl="0">
-              <a:lnSpc>
-                <a:spcPct val="90000"/>
-              </a:lnSpc>
-              <a:spcBef>
-                <a:spcPts val="1000"/>
-              </a:spcBef>
-              <a:spcAft>
-                <a:spcPts val="0"/>
-              </a:spcAft>
-              <a:buSzPts val="1800"/>
-              <a:buFont typeface="Arial"/>
-              <a:buAutoNum type="arabicPeriod"/>
-            </a:pPr>
-            <a:r>
-              <a:rPr lang="en-US" sz="2200" b="0" i="0" u="none" strike="noStrike">
-                <a:latin typeface="Calibri"/>
-                <a:ea typeface="Calibri"/>
-                <a:cs typeface="Calibri"/>
-                <a:sym typeface="Calibri"/>
-              </a:rPr>
-              <a:t>D. V. Kapare, S. Lokhande, and S. Kale, “Automatic Cash Deposite Machine With Currency Detection Using Fluorescent And UV Light,” vol. 3, pp. 309–311, 2020. </a:t>
-            </a:r>
-            <a:r>
-              <a:rPr lang="en-US" sz="2000">
-                <a:latin typeface="Calibri"/>
-                <a:ea typeface="Calibri"/>
-                <a:cs typeface="Calibri"/>
-                <a:sym typeface="Calibri"/>
-              </a:rPr>
-              <a:t> </a:t>
-            </a:r>
-            <a:endParaRPr sz="2000"/>
-          </a:p>
-          <a:p>
-            <a:pPr marL="558800" lvl="0" indent="-457200" algn="l" rtl="0">
-              <a:lnSpc>
-                <a:spcPct val="90000"/>
-              </a:lnSpc>
-              <a:spcBef>
-                <a:spcPts val="0"/>
-              </a:spcBef>
-              <a:spcAft>
-                <a:spcPts val="0"/>
-              </a:spcAft>
-              <a:buSzPts val="2000"/>
-              <a:buFont typeface="Arial"/>
-              <a:buAutoNum type="arabicPeriod"/>
-            </a:pPr>
-            <a:r>
-              <a:rPr lang="en-US" sz="2200"/>
-              <a:t>P. P. Binod Prasad Yadav, C. S. Patil, R. R. Karhe, “An automatic recognition of fake Indian paper currency note using MATLAB,” Certif. Int. J. Eng. Sci. Innov. Technol., vol. 9001, no. 4, pp. 2319–5967, 2020, [Online]. Available: http://www.ijesit.com/Volume 3/Issue 4/IJESIT201404_77.pdf. </a:t>
-            </a:r>
-            <a:r>
-              <a:rPr lang="en-US" sz="2000"/>
-              <a:t> </a:t>
-            </a:r>
-            <a:endParaRPr/>
-          </a:p>
-          <a:p>
-            <a:pPr marL="558800" lvl="0" indent="-457200" algn="l" rtl="0">
-              <a:lnSpc>
-                <a:spcPct val="90000"/>
-              </a:lnSpc>
-              <a:spcBef>
-                <a:spcPts val="0"/>
-              </a:spcBef>
-              <a:spcAft>
-                <a:spcPts val="0"/>
-              </a:spcAft>
-              <a:buSzPts val="2000"/>
-              <a:buFont typeface="Arial"/>
-              <a:buAutoNum type="arabicPeriod"/>
-            </a:pPr>
-            <a:r>
-              <a:rPr lang="en-US" sz="2200"/>
-              <a:t>S. Arya and M. Sasikumar, “Fake CurrencyDetection,” 2019 Int. Conf. Recent Adv. EnergyEfficient Comput. Commun. ICRAECC 2019, pp.2019–2022, 2019, doi:10.1109/ICRAECC43874.2019.8994968. </a:t>
-            </a:r>
-            <a:endParaRPr/>
-          </a:p>
-          <a:p>
-            <a:pPr marL="558800" lvl="0" indent="-457200" algn="l" rtl="0">
-              <a:lnSpc>
-                <a:spcPct val="90000"/>
-              </a:lnSpc>
-              <a:spcBef>
-                <a:spcPts val="0"/>
-              </a:spcBef>
-              <a:spcAft>
-                <a:spcPts val="0"/>
-              </a:spcAft>
-              <a:buSzPts val="2000"/>
-              <a:buFont typeface="Arial"/>
-              <a:buAutoNum type="arabicPeriod"/>
-            </a:pPr>
-            <a:r>
-              <a:rPr lang="en-US" sz="2200"/>
-              <a:t>A. Ghimire, S. Thapa, A. K. Jha, S. Adhikari, and A. Kumar, “Accelerating business growth with bigdata and artificial intelligence,” Proc. 4th Int. Conf.IoT Soc. Mobile, Anal. Cloud, ISMAC 2020, pp.441–448, 2020,doi:10.1109/ISMAC49090.2020.9243318. </a:t>
-            </a:r>
-            <a:endParaRPr/>
-          </a:p>
-        </p:txBody>
-      </p:sp>
-    </p:spTree>
-  </p:cSld>
-  <p:clrMapOvr>
-    <a:masterClrMapping/>
-  </p:clrMapOvr>
-</p:sld>
-</file>
-
-<file path=ppt/slides/slide18.xml><?xml version="1.0" encoding="utf-8"?>
-<p:sld xmlns:a="http://schemas.openxmlformats.org/drawingml/2006/main" xmlns:r="http://schemas.openxmlformats.org/officeDocument/2006/relationships" xmlns:p="http://schemas.openxmlformats.org/presentationml/2006/main">
-  <p:cSld>
-    <p:spTree>
-      <p:nvGrpSpPr>
-        <p:cNvPr id="1" name="Shape 165"/>
-        <p:cNvGrpSpPr/>
-        <p:nvPr/>
-      </p:nvGrpSpPr>
-      <p:grpSpPr>
-        <a:xfrm>
-          <a:off x="0" y="0"/>
-          <a:ext cx="0" cy="0"/>
-          <a:chOff x="0" y="0"/>
-          <a:chExt cx="0" cy="0"/>
-        </a:xfrm>
-      </p:grpSpPr>
-      <p:sp>
-        <p:nvSpPr>
-          <p:cNvPr id="166" name="Google Shape;166;p26"/>
-          <p:cNvSpPr txBox="1"/>
-          <p:nvPr/>
-        </p:nvSpPr>
-        <p:spPr>
-          <a:xfrm>
-            <a:off x="1959935" y="2705725"/>
-            <a:ext cx="8272130" cy="1446550"/>
-          </a:xfrm>
-          <a:prstGeom prst="rect">
-            <a:avLst/>
-          </a:prstGeom>
-          <a:noFill/>
-          <a:ln>
-            <a:noFill/>
-          </a:ln>
-        </p:spPr>
-        <p:txBody>
-          <a:bodyPr spcFirstLastPara="1" wrap="square" lIns="91425" tIns="45700" rIns="91425" bIns="45700" anchor="t" anchorCtr="0">
-            <a:spAutoFit/>
-          </a:bodyPr>
-          <a:lstStyle/>
-          <a:p>
-            <a:pPr marL="0" marR="0" lvl="0" indent="0" algn="ctr" rtl="0">
-              <a:lnSpc>
-                <a:spcPct val="100000"/>
-              </a:lnSpc>
-              <a:spcBef>
-                <a:spcPts val="0"/>
-              </a:spcBef>
-              <a:spcAft>
-                <a:spcPts val="0"/>
-              </a:spcAft>
-              <a:buNone/>
-            </a:pPr>
-            <a:r>
-              <a:rPr lang="en-US" sz="8800" b="0" i="0" u="none" strike="noStrike" cap="none">
-                <a:solidFill>
-                  <a:srgbClr val="000000"/>
-                </a:solidFill>
-                <a:latin typeface="Calibri"/>
-                <a:ea typeface="Calibri"/>
-                <a:cs typeface="Calibri"/>
-                <a:sym typeface="Calibri"/>
-              </a:rPr>
-              <a:t>THANK YOU</a:t>
-            </a:r>
-            <a:endParaRPr sz="8800" b="0" i="0" u="none" strike="noStrike" cap="none">
-              <a:solidFill>
-                <a:srgbClr val="000000"/>
-              </a:solidFill>
-              <a:latin typeface="Calibri"/>
-              <a:ea typeface="Calibri"/>
-              <a:cs typeface="Calibri"/>
-              <a:sym typeface="Calibri"/>
-            </a:endParaRPr>
           </a:p>
         </p:txBody>
       </p:sp>
@@ -18999,6 +19851,622 @@
 </p:sld>
 </file>
 
+<file path=ppt/slides/slide20.xml><?xml version="1.0" encoding="utf-8"?>
+<p:sld xmlns:a="http://schemas.openxmlformats.org/drawingml/2006/main" xmlns:r="http://schemas.openxmlformats.org/officeDocument/2006/relationships" xmlns:p="http://schemas.openxmlformats.org/presentationml/2006/main">
+  <p:cSld>
+    <p:spTree>
+      <p:nvGrpSpPr>
+        <p:cNvPr id="1" name="Shape 153"/>
+        <p:cNvGrpSpPr/>
+        <p:nvPr/>
+      </p:nvGrpSpPr>
+      <p:grpSpPr>
+        <a:xfrm>
+          <a:off x="0" y="0"/>
+          <a:ext cx="0" cy="0"/>
+          <a:chOff x="0" y="0"/>
+          <a:chExt cx="0" cy="0"/>
+        </a:xfrm>
+      </p:grpSpPr>
+      <p:sp>
+        <p:nvSpPr>
+          <p:cNvPr id="154" name="Google Shape;154;p25"/>
+          <p:cNvSpPr txBox="1">
+            <a:spLocks noGrp="1"/>
+          </p:cNvSpPr>
+          <p:nvPr>
+            <p:ph type="title"/>
+          </p:nvPr>
+        </p:nvSpPr>
+        <p:spPr>
+          <a:xfrm>
+            <a:off x="838200" y="599052"/>
+            <a:ext cx="10515600" cy="770338"/>
+          </a:xfrm>
+          <a:prstGeom prst="rect">
+            <a:avLst/>
+          </a:prstGeom>
+          <a:noFill/>
+          <a:ln>
+            <a:noFill/>
+          </a:ln>
+        </p:spPr>
+        <p:txBody>
+          <a:bodyPr spcFirstLastPara="1" wrap="square" lIns="91425" tIns="45700" rIns="91425" bIns="45700" anchor="ctr" anchorCtr="0">
+            <a:normAutofit fontScale="90000"/>
+          </a:bodyPr>
+          <a:lstStyle/>
+          <a:p>
+            <a:pPr marL="0" lvl="0" indent="0" algn="ctr" rtl="0">
+              <a:lnSpc>
+                <a:spcPct val="90000"/>
+              </a:lnSpc>
+              <a:spcBef>
+                <a:spcPts val="0"/>
+              </a:spcBef>
+              <a:spcAft>
+                <a:spcPts val="0"/>
+              </a:spcAft>
+              <a:buClr>
+                <a:schemeClr val="dk1"/>
+              </a:buClr>
+              <a:buSzPct val="100000"/>
+              <a:buFont typeface="Calibri"/>
+              <a:buNone/>
+            </a:pPr>
+            <a:r>
+              <a:rPr lang="en-US" sz="6000"/>
+              <a:t>Software Requirements</a:t>
+            </a:r>
+            <a:endParaRPr sz="6000"/>
+          </a:p>
+        </p:txBody>
+      </p:sp>
+      <p:sp>
+        <p:nvSpPr>
+          <p:cNvPr id="155" name="Google Shape;155;p25"/>
+          <p:cNvSpPr txBox="1">
+            <a:spLocks noGrp="1"/>
+          </p:cNvSpPr>
+          <p:nvPr>
+            <p:ph type="body" idx="1"/>
+          </p:nvPr>
+        </p:nvSpPr>
+        <p:spPr>
+          <a:xfrm>
+            <a:off x="838200" y="1850066"/>
+            <a:ext cx="10515600" cy="3317359"/>
+          </a:xfrm>
+          <a:prstGeom prst="rect">
+            <a:avLst/>
+          </a:prstGeom>
+          <a:noFill/>
+          <a:ln>
+            <a:noFill/>
+          </a:ln>
+        </p:spPr>
+        <p:txBody>
+          <a:bodyPr spcFirstLastPara="1" wrap="square" lIns="91425" tIns="45700" rIns="91425" bIns="45700" anchor="t" anchorCtr="0">
+            <a:normAutofit/>
+          </a:bodyPr>
+          <a:lstStyle/>
+          <a:p>
+            <a:pPr marL="635000" lvl="0" indent="-457200" algn="just" rtl="0">
+              <a:lnSpc>
+                <a:spcPct val="90000"/>
+              </a:lnSpc>
+              <a:spcBef>
+                <a:spcPts val="0"/>
+              </a:spcBef>
+              <a:spcAft>
+                <a:spcPts val="0"/>
+              </a:spcAft>
+              <a:buSzPts val="2800"/>
+              <a:buChar char="•"/>
+            </a:pPr>
+            <a:r>
+              <a:rPr lang="en-US"/>
+              <a:t>Python</a:t>
+            </a:r>
+            <a:endParaRPr/>
+          </a:p>
+          <a:p>
+            <a:pPr marL="635000" lvl="0" indent="-457200" algn="just" rtl="0">
+              <a:lnSpc>
+                <a:spcPct val="90000"/>
+              </a:lnSpc>
+              <a:spcBef>
+                <a:spcPts val="0"/>
+              </a:spcBef>
+              <a:spcAft>
+                <a:spcPts val="0"/>
+              </a:spcAft>
+              <a:buSzPts val="2800"/>
+              <a:buChar char="•"/>
+            </a:pPr>
+            <a:r>
+              <a:rPr lang="en-US"/>
+              <a:t>Flask</a:t>
+            </a:r>
+            <a:endParaRPr/>
+          </a:p>
+          <a:p>
+            <a:pPr marL="635000" lvl="0" indent="-457200" algn="just" rtl="0">
+              <a:lnSpc>
+                <a:spcPct val="90000"/>
+              </a:lnSpc>
+              <a:spcBef>
+                <a:spcPts val="0"/>
+              </a:spcBef>
+              <a:spcAft>
+                <a:spcPts val="0"/>
+              </a:spcAft>
+              <a:buSzPts val="2800"/>
+              <a:buChar char="•"/>
+            </a:pPr>
+            <a:r>
+              <a:rPr lang="en-US"/>
+              <a:t>Jupyter notebook</a:t>
+            </a:r>
+            <a:endParaRPr/>
+          </a:p>
+          <a:p>
+            <a:pPr marL="635000" lvl="0" indent="-457200" algn="just" rtl="0">
+              <a:lnSpc>
+                <a:spcPct val="90000"/>
+              </a:lnSpc>
+              <a:spcBef>
+                <a:spcPts val="0"/>
+              </a:spcBef>
+              <a:spcAft>
+                <a:spcPts val="0"/>
+              </a:spcAft>
+              <a:buSzPts val="2800"/>
+              <a:buChar char="•"/>
+            </a:pPr>
+            <a:r>
+              <a:rPr lang="en-US"/>
+              <a:t>Visual Studio Code</a:t>
+            </a:r>
+            <a:endParaRPr/>
+          </a:p>
+          <a:p>
+            <a:pPr marL="635000" lvl="0" indent="-457200" algn="just" rtl="0">
+              <a:lnSpc>
+                <a:spcPct val="90000"/>
+              </a:lnSpc>
+              <a:spcBef>
+                <a:spcPts val="0"/>
+              </a:spcBef>
+              <a:spcAft>
+                <a:spcPts val="0"/>
+              </a:spcAft>
+              <a:buSzPts val="2800"/>
+              <a:buChar char="•"/>
+            </a:pPr>
+            <a:r>
+              <a:rPr lang="en-US"/>
+              <a:t>Nodejs</a:t>
+            </a:r>
+            <a:endParaRPr/>
+          </a:p>
+        </p:txBody>
+      </p:sp>
+    </p:spTree>
+  </p:cSld>
+  <p:clrMapOvr>
+    <a:masterClrMapping/>
+  </p:clrMapOvr>
+</p:sld>
+</file>
+
+<file path=ppt/slides/slide21.xml><?xml version="1.0" encoding="utf-8"?>
+<p:sld xmlns:a="http://schemas.openxmlformats.org/drawingml/2006/main" xmlns:r="http://schemas.openxmlformats.org/officeDocument/2006/relationships" xmlns:p="http://schemas.openxmlformats.org/presentationml/2006/main">
+  <p:cSld>
+    <p:spTree>
+      <p:nvGrpSpPr>
+        <p:cNvPr id="1" name="Shape 159"/>
+        <p:cNvGrpSpPr/>
+        <p:nvPr/>
+      </p:nvGrpSpPr>
+      <p:grpSpPr>
+        <a:xfrm>
+          <a:off x="0" y="0"/>
+          <a:ext cx="0" cy="0"/>
+          <a:chOff x="0" y="0"/>
+          <a:chExt cx="0" cy="0"/>
+        </a:xfrm>
+      </p:grpSpPr>
+      <p:sp>
+        <p:nvSpPr>
+          <p:cNvPr id="160" name="Google Shape;160;p8"/>
+          <p:cNvSpPr txBox="1">
+            <a:spLocks noGrp="1"/>
+          </p:cNvSpPr>
+          <p:nvPr>
+            <p:ph type="title"/>
+          </p:nvPr>
+        </p:nvSpPr>
+        <p:spPr>
+          <a:xfrm>
+            <a:off x="838200" y="503349"/>
+            <a:ext cx="10515600" cy="770338"/>
+          </a:xfrm>
+          <a:prstGeom prst="rect">
+            <a:avLst/>
+          </a:prstGeom>
+          <a:noFill/>
+          <a:ln>
+            <a:noFill/>
+          </a:ln>
+        </p:spPr>
+        <p:txBody>
+          <a:bodyPr spcFirstLastPara="1" wrap="square" lIns="91425" tIns="45700" rIns="91425" bIns="45700" anchor="ctr" anchorCtr="0">
+            <a:normAutofit fontScale="90000"/>
+          </a:bodyPr>
+          <a:lstStyle/>
+          <a:p>
+            <a:pPr marL="0" lvl="0" indent="0" algn="ctr" rtl="0">
+              <a:lnSpc>
+                <a:spcPct val="90000"/>
+              </a:lnSpc>
+              <a:spcBef>
+                <a:spcPts val="0"/>
+              </a:spcBef>
+              <a:spcAft>
+                <a:spcPts val="0"/>
+              </a:spcAft>
+              <a:buClr>
+                <a:schemeClr val="dk1"/>
+              </a:buClr>
+              <a:buSzPct val="100000"/>
+              <a:buFont typeface="Calibri"/>
+              <a:buNone/>
+            </a:pPr>
+            <a:r>
+              <a:rPr lang="en-US" sz="6000"/>
+              <a:t>Paper References</a:t>
+            </a:r>
+            <a:endParaRPr sz="6000"/>
+          </a:p>
+        </p:txBody>
+      </p:sp>
+      <p:sp>
+        <p:nvSpPr>
+          <p:cNvPr id="161" name="Google Shape;161;p8"/>
+          <p:cNvSpPr txBox="1">
+            <a:spLocks noGrp="1"/>
+          </p:cNvSpPr>
+          <p:nvPr>
+            <p:ph type="body" idx="1"/>
+          </p:nvPr>
+        </p:nvSpPr>
+        <p:spPr>
+          <a:xfrm>
+            <a:off x="838200" y="1509823"/>
+            <a:ext cx="10515600" cy="4844828"/>
+          </a:xfrm>
+          <a:prstGeom prst="rect">
+            <a:avLst/>
+          </a:prstGeom>
+          <a:noFill/>
+          <a:ln>
+            <a:noFill/>
+          </a:ln>
+        </p:spPr>
+        <p:txBody>
+          <a:bodyPr spcFirstLastPara="1" wrap="square" lIns="91425" tIns="45700" rIns="91425" bIns="45700" anchor="t" anchorCtr="0">
+            <a:normAutofit/>
+          </a:bodyPr>
+          <a:lstStyle/>
+          <a:p>
+            <a:pPr marL="571500" lvl="0" indent="-457200" algn="l" rtl="0">
+              <a:lnSpc>
+                <a:spcPct val="90000"/>
+              </a:lnSpc>
+              <a:spcBef>
+                <a:spcPts val="1000"/>
+              </a:spcBef>
+              <a:spcAft>
+                <a:spcPts val="0"/>
+              </a:spcAft>
+              <a:buSzPts val="1800"/>
+              <a:buFont typeface="Arial"/>
+              <a:buAutoNum type="arabicPeriod"/>
+            </a:pPr>
+            <a:r>
+              <a:rPr lang="en-US" sz="2200" b="0" i="0" u="none" strike="noStrike" dirty="0">
+                <a:latin typeface="Calibri"/>
+                <a:ea typeface="Calibri"/>
+                <a:cs typeface="Calibri"/>
+                <a:sym typeface="Calibri"/>
+              </a:rPr>
+              <a:t>D. V. </a:t>
+            </a:r>
+            <a:r>
+              <a:rPr lang="en-US" sz="2200" b="0" i="0" u="none" strike="noStrike" dirty="0" err="1">
+                <a:latin typeface="Calibri"/>
+                <a:ea typeface="Calibri"/>
+                <a:cs typeface="Calibri"/>
+                <a:sym typeface="Calibri"/>
+              </a:rPr>
+              <a:t>Kapare</a:t>
+            </a:r>
+            <a:r>
+              <a:rPr lang="en-US" sz="2200" b="0" i="0" u="none" strike="noStrike" dirty="0">
+                <a:latin typeface="Calibri"/>
+                <a:ea typeface="Calibri"/>
+                <a:cs typeface="Calibri"/>
+                <a:sym typeface="Calibri"/>
+              </a:rPr>
+              <a:t>, S. </a:t>
+            </a:r>
+            <a:r>
+              <a:rPr lang="en-US" sz="2200" b="0" i="0" u="none" strike="noStrike" dirty="0" err="1">
+                <a:latin typeface="Calibri"/>
+                <a:ea typeface="Calibri"/>
+                <a:cs typeface="Calibri"/>
+                <a:sym typeface="Calibri"/>
+              </a:rPr>
+              <a:t>Lokhande</a:t>
+            </a:r>
+            <a:r>
+              <a:rPr lang="en-US" sz="2200" b="0" i="0" u="none" strike="noStrike" dirty="0">
+                <a:latin typeface="Calibri"/>
+                <a:ea typeface="Calibri"/>
+                <a:cs typeface="Calibri"/>
+                <a:sym typeface="Calibri"/>
+              </a:rPr>
+              <a:t>, and S. Kale, “Automatic Cash </a:t>
+            </a:r>
+            <a:r>
+              <a:rPr lang="en-US" sz="2200" b="0" i="0" u="none" strike="noStrike" dirty="0" err="1">
+                <a:latin typeface="Calibri"/>
+                <a:ea typeface="Calibri"/>
+                <a:cs typeface="Calibri"/>
+                <a:sym typeface="Calibri"/>
+              </a:rPr>
+              <a:t>Deposite</a:t>
+            </a:r>
+            <a:r>
+              <a:rPr lang="en-US" sz="2200" b="0" i="0" u="none" strike="noStrike" dirty="0">
+                <a:latin typeface="Calibri"/>
+                <a:ea typeface="Calibri"/>
+                <a:cs typeface="Calibri"/>
+                <a:sym typeface="Calibri"/>
+              </a:rPr>
+              <a:t> Machine With Currency Detection Using Fluorescent And UV Light,” vol. 3, pp. 309–311, 2020. </a:t>
+            </a:r>
+            <a:r>
+              <a:rPr lang="en-US" sz="2000" dirty="0">
+                <a:latin typeface="Calibri"/>
+                <a:ea typeface="Calibri"/>
+                <a:cs typeface="Calibri"/>
+                <a:sym typeface="Calibri"/>
+              </a:rPr>
+              <a:t> </a:t>
+            </a:r>
+            <a:endParaRPr sz="2000" dirty="0"/>
+          </a:p>
+          <a:p>
+            <a:pPr marL="558800" lvl="0" indent="-457200" algn="l" rtl="0">
+              <a:lnSpc>
+                <a:spcPct val="90000"/>
+              </a:lnSpc>
+              <a:spcBef>
+                <a:spcPts val="0"/>
+              </a:spcBef>
+              <a:spcAft>
+                <a:spcPts val="0"/>
+              </a:spcAft>
+              <a:buSzPts val="2000"/>
+              <a:buFont typeface="Arial"/>
+              <a:buAutoNum type="arabicPeriod"/>
+            </a:pPr>
+            <a:r>
+              <a:rPr lang="en-US" sz="2200" dirty="0"/>
+              <a:t>P. P. Binod Prasad Yadav, C. S. Patil, R. R. </a:t>
+            </a:r>
+            <a:r>
+              <a:rPr lang="en-US" sz="2200" dirty="0" err="1"/>
+              <a:t>Karhe</a:t>
+            </a:r>
+            <a:r>
+              <a:rPr lang="en-US" sz="2200" dirty="0"/>
+              <a:t>, “An automatic recognition of fake Indian paper currency note using MATLAB,” Certif. Int. J. Eng. Sci. </a:t>
+            </a:r>
+            <a:r>
+              <a:rPr lang="en-US" sz="2200" dirty="0" err="1"/>
+              <a:t>Innov</a:t>
+            </a:r>
+            <a:r>
+              <a:rPr lang="en-US" sz="2200" dirty="0"/>
+              <a:t>. Technol., vol. 9001, no. 4, pp. 2319–5967, 2020, [Online]. Available: http://www.ijesit.com/Volume 3/Issue 4/IJESIT201404_77.pdf. </a:t>
+            </a:r>
+            <a:r>
+              <a:rPr lang="en-US" sz="2000" dirty="0"/>
+              <a:t> </a:t>
+            </a:r>
+            <a:endParaRPr dirty="0"/>
+          </a:p>
+          <a:p>
+            <a:pPr marL="558800" lvl="0" indent="-457200" algn="l" rtl="0">
+              <a:lnSpc>
+                <a:spcPct val="90000"/>
+              </a:lnSpc>
+              <a:spcBef>
+                <a:spcPts val="0"/>
+              </a:spcBef>
+              <a:spcAft>
+                <a:spcPts val="0"/>
+              </a:spcAft>
+              <a:buSzPts val="2000"/>
+              <a:buFont typeface="Arial"/>
+              <a:buAutoNum type="arabicPeriod"/>
+            </a:pPr>
+            <a:r>
+              <a:rPr lang="en-US" sz="2200" dirty="0"/>
+              <a:t>S. Arya and M. Sasikumar, “Fake </a:t>
+            </a:r>
+            <a:r>
+              <a:rPr lang="en-US" sz="2200" dirty="0" err="1"/>
+              <a:t>CurrencyDetection</a:t>
+            </a:r>
+            <a:r>
+              <a:rPr lang="en-US" sz="2200" dirty="0"/>
+              <a:t>,” 2019 Int. Conf. Recent Adv. </a:t>
+            </a:r>
+            <a:r>
+              <a:rPr lang="en-US" sz="2200" dirty="0" err="1"/>
+              <a:t>EnergyEfficient</a:t>
+            </a:r>
+            <a:r>
+              <a:rPr lang="en-US" sz="2200" dirty="0"/>
+              <a:t> </a:t>
+            </a:r>
+            <a:r>
+              <a:rPr lang="en-US" sz="2200" dirty="0" err="1"/>
+              <a:t>Comput</a:t>
+            </a:r>
+            <a:r>
+              <a:rPr lang="en-US" sz="2200" dirty="0"/>
+              <a:t>. </a:t>
+            </a:r>
+            <a:r>
+              <a:rPr lang="en-US" sz="2200" dirty="0" err="1"/>
+              <a:t>Commun</a:t>
+            </a:r>
+            <a:r>
+              <a:rPr lang="en-US" sz="2200" dirty="0"/>
+              <a:t>. ICRAECC 2019, pp.2019–2022, 2019, doi:10.1109/ICRAECC43874.2019.8994968. </a:t>
+            </a:r>
+            <a:endParaRPr dirty="0"/>
+          </a:p>
+          <a:p>
+            <a:pPr marL="558800" lvl="0" indent="-457200" algn="l" rtl="0">
+              <a:lnSpc>
+                <a:spcPct val="90000"/>
+              </a:lnSpc>
+              <a:spcBef>
+                <a:spcPts val="0"/>
+              </a:spcBef>
+              <a:spcAft>
+                <a:spcPts val="0"/>
+              </a:spcAft>
+              <a:buSzPts val="2000"/>
+              <a:buFont typeface="Arial"/>
+              <a:buAutoNum type="arabicPeriod"/>
+            </a:pPr>
+            <a:r>
+              <a:rPr lang="en-US" sz="2200" dirty="0"/>
+              <a:t>A. Ghimire, S. Thapa, A. K. Jha, S. Adhikari, and A. Kumar, “Accelerating business growth with bigdata and artificial intelligence,” Proc. 4th Int. </a:t>
+            </a:r>
+            <a:r>
+              <a:rPr lang="en-US" sz="2200" dirty="0" err="1"/>
+              <a:t>Conf.IoT</a:t>
+            </a:r>
+            <a:r>
+              <a:rPr lang="en-US" sz="2200" dirty="0"/>
+              <a:t> Soc. Mobile, Anal. Cloud, ISMAC 2020, pp.441–448, 2020,doi:10.1109/ISMAC49090.2020.9243318. </a:t>
+            </a:r>
+            <a:endParaRPr dirty="0"/>
+          </a:p>
+        </p:txBody>
+      </p:sp>
+    </p:spTree>
+  </p:cSld>
+  <p:clrMapOvr>
+    <a:masterClrMapping/>
+  </p:clrMapOvr>
+</p:sld>
+</file>
+
+<file path=ppt/slides/slide22.xml><?xml version="1.0" encoding="utf-8"?>
+<p:sld xmlns:a="http://schemas.openxmlformats.org/drawingml/2006/main" xmlns:r="http://schemas.openxmlformats.org/officeDocument/2006/relationships" xmlns:p="http://schemas.openxmlformats.org/presentationml/2006/main">
+  <p:cSld>
+    <p:spTree>
+      <p:nvGrpSpPr>
+        <p:cNvPr id="1" name="Shape 165"/>
+        <p:cNvGrpSpPr/>
+        <p:nvPr/>
+      </p:nvGrpSpPr>
+      <p:grpSpPr>
+        <a:xfrm>
+          <a:off x="0" y="0"/>
+          <a:ext cx="0" cy="0"/>
+          <a:chOff x="0" y="0"/>
+          <a:chExt cx="0" cy="0"/>
+        </a:xfrm>
+      </p:grpSpPr>
+      <p:sp>
+        <p:nvSpPr>
+          <p:cNvPr id="166" name="Google Shape;166;p26"/>
+          <p:cNvSpPr txBox="1"/>
+          <p:nvPr/>
+        </p:nvSpPr>
+        <p:spPr>
+          <a:xfrm>
+            <a:off x="1959935" y="2705725"/>
+            <a:ext cx="8272130" cy="1446550"/>
+          </a:xfrm>
+          <a:prstGeom prst="rect">
+            <a:avLst/>
+          </a:prstGeom>
+          <a:noFill/>
+          <a:ln>
+            <a:noFill/>
+          </a:ln>
+        </p:spPr>
+        <p:txBody>
+          <a:bodyPr spcFirstLastPara="1" wrap="square" lIns="91425" tIns="45700" rIns="91425" bIns="45700" anchor="t" anchorCtr="0">
+            <a:spAutoFit/>
+          </a:bodyPr>
+          <a:lstStyle/>
+          <a:p>
+            <a:pPr marL="0" marR="0" lvl="0" indent="0" algn="ctr" rtl="0">
+              <a:lnSpc>
+                <a:spcPct val="100000"/>
+              </a:lnSpc>
+              <a:spcBef>
+                <a:spcPts val="0"/>
+              </a:spcBef>
+              <a:spcAft>
+                <a:spcPts val="0"/>
+              </a:spcAft>
+              <a:buNone/>
+            </a:pPr>
+            <a:r>
+              <a:rPr lang="en-US" sz="8800" b="0" i="0" u="none" strike="noStrike" cap="none">
+                <a:solidFill>
+                  <a:srgbClr val="000000"/>
+                </a:solidFill>
+                <a:latin typeface="Calibri"/>
+                <a:ea typeface="Calibri"/>
+                <a:cs typeface="Calibri"/>
+                <a:sym typeface="Calibri"/>
+              </a:rPr>
+              <a:t>THANK YOU</a:t>
+            </a:r>
+            <a:endParaRPr sz="8800" b="0" i="0" u="none" strike="noStrike" cap="none">
+              <a:solidFill>
+                <a:srgbClr val="000000"/>
+              </a:solidFill>
+              <a:latin typeface="Calibri"/>
+              <a:ea typeface="Calibri"/>
+              <a:cs typeface="Calibri"/>
+              <a:sym typeface="Calibri"/>
+            </a:endParaRPr>
+          </a:p>
+        </p:txBody>
+      </p:sp>
+    </p:spTree>
+  </p:cSld>
+  <p:clrMapOvr>
+    <a:masterClrMapping/>
+  </p:clrMapOvr>
+</p:sld>
+</file>
+
 <file path=ppt/slides/slide3.xml><?xml version="1.0" encoding="utf-8"?>
 <p:sld xmlns:a="http://schemas.openxmlformats.org/drawingml/2006/main" xmlns:r="http://schemas.openxmlformats.org/officeDocument/2006/relationships" xmlns:p="http://schemas.openxmlformats.org/presentationml/2006/main">
   <p:cSld>
@@ -19353,10 +20821,10 @@
               <a:buNone/>
             </a:pPr>
             <a:r>
-              <a:rPr lang="en-US"/>
+              <a:rPr lang="en-US" dirty="0"/>
               <a:t>In the existing system, different traditional strategies and methods are available for fake currency identification based on the colors, width, and serial numbers mentioned. Processing these attributes by using digital technologies will give high false positive results leading to lower accuracy of the technology. In this system First, to classify the nationality to use certain predefined rules. Areas of significance, and then derive the denomination value. Using features such as scale, color, or script on a note, based on how distinctive the notes are in the same region.</a:t>
             </a:r>
-            <a:endParaRPr/>
+            <a:endParaRPr dirty="0"/>
           </a:p>
         </p:txBody>
       </p:sp>
@@ -19931,13 +21399,13 @@
         <p:spPr/>
         <p:txBody>
           <a:bodyPr>
-            <a:normAutofit fontScale="92500" lnSpcReduction="20000"/>
+            <a:normAutofit fontScale="92500" lnSpcReduction="10000"/>
           </a:bodyPr>
           <a:lstStyle/>
           <a:p>
             <a:r>
               <a:rPr lang="en-US" dirty="0"/>
-              <a:t>In this century where the majority of people are aware of technology and how it works, many of them indulge in unlawful activities. One of such activities is the production of fake currency which is practiced to deceive people. In this proposal, it is focused on this illegitimate practice and try to bring forward a solution for it. According to a survey, the maximum number of cases of counterfeit in India still relate to fake currency, There were 132 cases of counterfeit currency in 2018, which shot up 37 percent to 181 in 2019. In Order to stop this fraudulent activity, a system is proposed that can be integrated into electronic devices that will detect the fake note as soon as it is scanned by the device. Some of the techniques which are considered are used previously and include KNN which will be utilized in the proposed system with enhanced accuracy. K-nearest neighbors (KNN) is an algorithm that stores all the available data and classifies a new data point based on the similarity. </a:t>
+              <a:t>In this century where the majority of people are aware of technology and how it works, many of them indulge in unlawful activities. One of such activities is the production of fake currency which is practiced to deceive people. In this proposal, it is focused on this illegitimate practice and try to bring forward a solution for it. According to a survey, the maximum number of cases of counterfeit in India still relate to fake currency, There were 132 cases of counterfeit currency in 2018, which shot up 37 percent to 181 in 2019. In Order to stop this fraudulent activity, a system is proposed that can be integrated into mobile devices that will detect the fake note as soon as it is scanned by the device. KNN is a SML algorithm which will be utilized in the proposed system with enhanced accuracy. K-nearest neighbors (KNN) is an algorithm that stores all the available data and classifies a new data point based on the similarity. </a:t>
             </a:r>
             <a:endParaRPr lang="en-IN" dirty="0"/>
           </a:p>

</xml_diff>